<commit_message>
Polishing Lesson 3, plus creating the second hour PPT and script for it.
</commit_message>
<xml_diff>
--- a/instructors/files/SWC slides R Shiny 2024 Fall.pptx
+++ b/instructors/files/SWC slides R Shiny 2024 Fall.pptx
@@ -5,7 +5,7 @@
     <p:sldMasterId id="2147483659" r:id="rId1"/>
   </p:sldMasterIdLst>
   <p:notesMasterIdLst>
-    <p:notesMasterId r:id="rId47"/>
+    <p:notesMasterId r:id="rId51"/>
   </p:notesMasterIdLst>
   <p:sldIdLst>
     <p:sldId id="256" r:id="rId2"/>
@@ -49,38 +49,42 @@
     <p:sldId id="298" r:id="rId40"/>
     <p:sldId id="299" r:id="rId41"/>
     <p:sldId id="300" r:id="rId42"/>
-    <p:sldId id="294" r:id="rId43"/>
-    <p:sldId id="261" r:id="rId44"/>
-    <p:sldId id="262" r:id="rId45"/>
-    <p:sldId id="282" r:id="rId46"/>
+    <p:sldId id="301" r:id="rId43"/>
+    <p:sldId id="302" r:id="rId44"/>
+    <p:sldId id="303" r:id="rId45"/>
+    <p:sldId id="304" r:id="rId46"/>
+    <p:sldId id="294" r:id="rId47"/>
+    <p:sldId id="261" r:id="rId48"/>
+    <p:sldId id="262" r:id="rId49"/>
+    <p:sldId id="282" r:id="rId50"/>
   </p:sldIdLst>
   <p:sldSz cx="9144000" cy="5143500" type="screen16x9"/>
   <p:notesSz cx="6858000" cy="9144000"/>
   <p:embeddedFontLst>
     <p:embeddedFont>
       <p:font typeface="Raleway" pitchFamily="2" charset="0"/>
-      <p:regular r:id="rId48"/>
-      <p:bold r:id="rId49"/>
-      <p:italic r:id="rId50"/>
-      <p:boldItalic r:id="rId51"/>
+      <p:regular r:id="rId52"/>
+      <p:bold r:id="rId53"/>
+      <p:italic r:id="rId54"/>
+      <p:boldItalic r:id="rId55"/>
     </p:embeddedFont>
     <p:embeddedFont>
       <p:font typeface="Simplified Arabic Fixed" panose="02070309020205020404" pitchFamily="49" charset="-78"/>
-      <p:regular r:id="rId52"/>
+      <p:regular r:id="rId56"/>
     </p:embeddedFont>
     <p:embeddedFont>
       <p:font typeface="Source Code Pro" panose="020B0509030403020204" pitchFamily="49" charset="0"/>
-      <p:regular r:id="rId53"/>
-      <p:bold r:id="rId54"/>
-      <p:italic r:id="rId55"/>
-      <p:boldItalic r:id="rId56"/>
-    </p:embeddedFont>
-    <p:embeddedFont>
-      <p:font typeface="Source Sans Pro" panose="020B0503030403020204" pitchFamily="34" charset="0"/>
       <p:regular r:id="rId57"/>
       <p:bold r:id="rId58"/>
       <p:italic r:id="rId59"/>
       <p:boldItalic r:id="rId60"/>
+    </p:embeddedFont>
+    <p:embeddedFont>
+      <p:font typeface="Source Sans Pro" panose="020B0503030403020204" pitchFamily="34" charset="0"/>
+      <p:regular r:id="rId61"/>
+      <p:bold r:id="rId62"/>
+      <p:italic r:id="rId63"/>
+      <p:boldItalic r:id="rId64"/>
     </p:embeddedFont>
   </p:embeddedFontLst>
   <p:defaultTextStyle>
@@ -4121,39 +4125,31 @@
           <a:p>
             <a:r>
               <a:rPr lang="en-US" dirty="0"/>
-              <a:t>I know we haven’t actually done much in R yet. But, now that we have all the basics of web development down, that changes now!</a:t>
-            </a:r>
-          </a:p>
-          <a:p>
-            <a:r>
-              <a:rPr lang="en-US" dirty="0"/>
-              <a:t>We’ll be spending the rest of our time in R and, in this hour, that’ll include learning the essentials of building a powerful Shiny app.</a:t>
-            </a:r>
-          </a:p>
-          <a:p>
-            <a:r>
-              <a:rPr lang="en-US" dirty="0"/>
-              <a:t>Such as learning how to add complex elements like tables to our UI, adding input widgets like drop-down menus to give your users something to play with, and learning about events and how to handle them.</a:t>
-            </a:r>
-          </a:p>
-          <a:p>
-            <a:r>
-              <a:rPr lang="en-US" dirty="0"/>
-              <a:t>Then, we’ll give users and ourselves more control over proceedings using a button and an observer, as well as add a set of tabs. </a:t>
-            </a:r>
-          </a:p>
-          <a:p>
-            <a:r>
-              <a:rPr lang="en-US" dirty="0"/>
-              <a:t>If we get through all this successfully, you’ll walk out with a </a:t>
-            </a:r>
-            <a:r>
-              <a:rPr lang="en-US" i="1" dirty="0"/>
-              <a:t>massive</a:t>
-            </a:r>
-            <a:r>
-              <a:rPr lang="en-US" dirty="0"/>
-              <a:t> toolkit with which to build a wide array of apps!</a:t>
+              <a:t>I know we haven’t actually done much in R yet. But, now that we have all the basics of web development down, that can change!</a:t>
+            </a:r>
+          </a:p>
+          <a:p>
+            <a:r>
+              <a:rPr lang="en-US" dirty="0"/>
+              <a:t>We’ll spend the rest of our time in R and, in this hour, that’ll include learning the essentials of R Shiny.</a:t>
+            </a:r>
+          </a:p>
+          <a:p>
+            <a:r>
+              <a:rPr lang="en-US" dirty="0"/>
+              <a:t>Such as learning how to add complex elements like tables to our app’s UI, adding input widgets like drop-down menus to give your users things to play with, and learning about events and how to handle them.</a:t>
+            </a:r>
+          </a:p>
+          <a:p>
+            <a:r>
+              <a:rPr lang="en-US" dirty="0"/>
+              <a:t>Then, we’ll give users and ourselves more control over proceedings using a button and an observer, as well as add a set of tabs to jazz up our UI. </a:t>
+            </a:r>
+          </a:p>
+          <a:p>
+            <a:r>
+              <a:rPr lang="en-US" dirty="0"/>
+              <a:t>If the concepts at the heart of this block of material click for you, you will possess a powerful toolkit that will allow you to build a wide array of apps!</a:t>
             </a:r>
           </a:p>
         </p:txBody>
@@ -4223,7 +4219,7 @@
             <a:pPr marL="457200" indent="-298450"/>
             <a:r>
               <a:rPr lang="en-US" dirty="0"/>
-              <a:t>Our app is pretty boring so far, and apps are really only useful when they allow users to do cool things. So, let’s add some cool things, starting with a table for users to view the </a:t>
+              <a:t>Our app is pretty boring so far, and apps are really about allowing users to do cool things. So, let’s add some cool things, starting with a table for users to view the </a:t>
             </a:r>
             <a:r>
               <a:rPr lang="en-US" dirty="0" err="1"/>
@@ -4231,7 +4227,7 @@
             </a:r>
             <a:r>
               <a:rPr lang="en-US" dirty="0"/>
-              <a:t> data set.</a:t>
+              <a:t> data set with.</a:t>
             </a:r>
           </a:p>
           <a:p>
@@ -4245,7 +4241,7 @@
             <a:pPr marL="457200" indent="-298450"/>
             <a:r>
               <a:rPr lang="en-US" dirty="0"/>
-              <a:t>And that’s true! But it’d be tedious to create such a large table in HTML ourselves. Thankfully, we can get R to do the hard stuff.</a:t>
+              <a:t>And yes you can build tables in HTML! But it’d be tedious to create such a large table in HTML ourselves. Thankfully, we can get R to do that for us.</a:t>
             </a:r>
           </a:p>
           <a:p>
@@ -4259,7 +4255,7 @@
             <a:pPr marL="457200" indent="-298450"/>
             <a:r>
               <a:rPr lang="en-US" dirty="0"/>
-              <a:t>First, any heavy lifting, aka data manipulation, to produce the final R version of the thing.</a:t>
+              <a:t>First, any heavy lifting, aka data manipulation, needed to produce the final R object must happen.</a:t>
             </a:r>
           </a:p>
           <a:p>
@@ -4342,13 +4338,13 @@
           <a:p>
             <a:r>
               <a:rPr lang="en-US" dirty="0"/>
-              <a:t>There’s a lot going on in the code we just looked at, so I think here maybe an analogy would help.</a:t>
-            </a:r>
-          </a:p>
-          <a:p>
-            <a:r>
-              <a:rPr lang="en-US" dirty="0"/>
-              <a:t>I want you to think of an app as a restaurant. In this analogy, the R code we put inside our render function’s braces are the recipe—how do we build the R object we want?</a:t>
+              <a:t>The code we just looked at had a lot going on! But rendering and outputting are core ideas of working in Shiny, so let’s see if we can solidify our understanding with an analogy.</a:t>
+            </a:r>
+          </a:p>
+          <a:p>
+            <a:r>
+              <a:rPr lang="en-US" dirty="0"/>
+              <a:t>I want you to think of an app as a restaurant. In this analogy, the R code we put inside our render function’s braces is the recipe—how do we build the R object we want?</a:t>
             </a:r>
           </a:p>
           <a:p>
@@ -4455,13 +4451,7 @@
           <a:p>
             <a:r>
               <a:rPr lang="en-US" dirty="0"/>
-              <a:t>So, our table is a little unexciting…we’ll fix that later by upgrading it to a DT table.</a:t>
-            </a:r>
-          </a:p>
-          <a:p>
-            <a:r>
-              <a:rPr lang="en-US" dirty="0"/>
-              <a:t>In the meantime, we can address it’s other shortcoming—it’s not interactive! We can’t actually do anything with it. </a:t>
+              <a:t>So, our table is present and functional, if a little unexciting…we’ll fix that later. In the meantime, we can address its other shortcoming—it’s not interactive! We can’t actually do anything with it but look at it.</a:t>
             </a:r>
           </a:p>
           <a:p>
@@ -4491,7 +4481,7 @@
           <a:p>
             <a:r>
               <a:rPr lang="en-US" dirty="0"/>
-              <a:t>Second, we use the input object to continuously pass the widget’s current value over to the server, where it can be watched.</a:t>
+              <a:t>Second, we use the input object to pass the widget’s current value over to the server, where we can watch that value for changes.</a:t>
             </a:r>
           </a:p>
           <a:p>
@@ -4608,7 +4598,7 @@
           <a:p>
             <a:r>
               <a:rPr lang="en-US" dirty="0"/>
-              <a:t>Now, we’re about to meet input, which passes to the server the current value of any input widgets, which it does using </a:t>
+              <a:t>Now, we’ll soon meet input, which does exactly the opposite--it passes to the server the current value of any input widgets, which it does using </a:t>
             </a:r>
             <a:r>
               <a:rPr lang="en-US" dirty="0" err="1"/>
@@ -4616,13 +4606,13 @@
             </a:r>
             <a:r>
               <a:rPr lang="en-US" dirty="0"/>
-              <a:t>. Same concept!</a:t>
-            </a:r>
-          </a:p>
-          <a:p>
-            <a:r>
-              <a:rPr lang="en-US" dirty="0"/>
-              <a:t>We also gave a label, which is text that accompanies the widget and, usually, describes what it does.</a:t>
+              <a:t>. </a:t>
+            </a:r>
+          </a:p>
+          <a:p>
+            <a:r>
+              <a:rPr lang="en-US" dirty="0"/>
+              <a:t>We also gave the widget a label, which is text that accompanies the widget and, usually, describes what it does to the user.</a:t>
             </a:r>
           </a:p>
           <a:p>
@@ -4634,7 +4624,7 @@
           <a:p>
             <a:r>
               <a:rPr lang="en-US" dirty="0"/>
-              <a:t>While they are all variations on this theme, all other Shiny inputs are very similar to </a:t>
+              <a:t>All other Shiny input widgets, of which there are many, are very similar to </a:t>
             </a:r>
             <a:r>
               <a:rPr lang="en-US" dirty="0" err="1"/>
@@ -4648,7 +4638,7 @@
           <a:p>
             <a:r>
               <a:rPr lang="en-US" dirty="0"/>
-              <a:t>Now, you’ll notice that our widget doesn’t actually do anything yet—we need to keep going and add the appropriate server code still. </a:t>
+              <a:t>Now, you’ll notice that our widget doesn’t actually do anything yet—to fix that, we need to keep going and add the appropriate server code to “wire up” this widget. </a:t>
             </a:r>
           </a:p>
           <a:p>
@@ -4842,7 +4832,7 @@
           <a:p>
             <a:r>
               <a:rPr lang="en-US" dirty="0"/>
-              <a:t>Ok, we’re finally to the most critical concept in all of R Shiny/web development! So, it’s time for some terminology.</a:t>
+              <a:t>Ok, we’re finally to the most critical concept in all of R Shiny/web development! So, it’s time to pause for some key terminology.</a:t>
             </a:r>
           </a:p>
           <a:p>
@@ -4856,19 +4846,19 @@
             </a:r>
             <a:r>
               <a:rPr lang="en-US" dirty="0"/>
-              <a:t> talk of events. An event is any action a user takes that the app *might* be tracking or watching out for. In this example, that’s our user selecting a new choice in our widget.</a:t>
-            </a:r>
-          </a:p>
-          <a:p>
-            <a:r>
-              <a:rPr lang="en-US" dirty="0"/>
-              <a:t>We also talk about handling events, which is having code run that figures out how the app will respond, if it will. In our case, it does respond by resorting the table for the user.</a:t>
-            </a:r>
-          </a:p>
-          <a:p>
-            <a:r>
-              <a:rPr lang="en-US" dirty="0"/>
-              <a:t>That brings us to the concept of reactions and reactivity. A reactive object is any object whose value might change as a result of an event—the user triggers the change, not us. </a:t>
+              <a:t> talk of events. An event is any action a user takes that the app *might* be tracking or watching for. In this example, an event would be a user selecting a new choice in our widget.</a:t>
+            </a:r>
+          </a:p>
+          <a:p>
+            <a:r>
+              <a:rPr lang="en-US" dirty="0"/>
+              <a:t>We also talk about handling events, which is having code run that determines the app’s reaction. In our case, our app’s reaction would be to resort the table. </a:t>
+            </a:r>
+          </a:p>
+          <a:p>
+            <a:r>
+              <a:rPr lang="en-US" dirty="0"/>
+              <a:t>That brings us to the concept of reactivity. A reactive object is any object whose value might change as a result of an event—the user triggers the change, not us. </a:t>
             </a:r>
           </a:p>
           <a:p>
@@ -4882,7 +4872,15 @@
             </a:r>
             <a:r>
               <a:rPr lang="en-US" dirty="0"/>
-              <a:t>. Its value will change every time the user selects a new choice.</a:t>
+              <a:t>. Its value changes every time the </a:t>
+            </a:r>
+            <a:r>
+              <a:rPr lang="en-US" i="1" dirty="0"/>
+              <a:t>user</a:t>
+            </a:r>
+            <a:r>
+              <a:rPr lang="en-US" dirty="0"/>
+              <a:t> selects a new choice.</a:t>
             </a:r>
           </a:p>
           <a:p>
@@ -4896,7 +4894,7 @@
             </a:r>
             <a:r>
               <a:rPr lang="en-US" dirty="0"/>
-              <a:t> and, thus, Shiny needs to watch it for events.</a:t>
+              <a:t> and, thus, Shiny needs to be watching inside it for events.</a:t>
             </a:r>
           </a:p>
           <a:p>
@@ -4918,13 +4916,19 @@
             </a:r>
             <a:r>
               <a:rPr lang="en-US" dirty="0"/>
-              <a:t>.</a:t>
-            </a:r>
-          </a:p>
-          <a:p>
-            <a:r>
-              <a:rPr lang="en-US" dirty="0"/>
-              <a:t>And so here’s the key idea: Whenever a reactive object, like </a:t>
+              <a:t> and R will watch it for events.</a:t>
+            </a:r>
+          </a:p>
+          <a:p>
+            <a:r>
+              <a:rPr lang="en-US" dirty="0"/>
+              <a:t>In general, if an R Shiny server function takes as an input an expression in braces, it’s probably a reactive context, although we will see one notable exception a bit later.</a:t>
+            </a:r>
+          </a:p>
+          <a:p>
+            <a:r>
+              <a:rPr lang="en-US" dirty="0"/>
+              <a:t>Here’s the key idea: Whenever a reactive object, like </a:t>
             </a:r>
             <a:r>
               <a:rPr lang="en-US" dirty="0" err="1"/>
@@ -4938,7 +4942,7 @@
           <a:p>
             <a:r>
               <a:rPr lang="en-US" dirty="0"/>
-              <a:t>The logic here actually makes sense. If a reactive context produces an output, like a table, and key inputs to that process have changed in value, maybe our outputs are “old” and need refreshing. The way to do that is to rerun the code that makes them. Make sense?</a:t>
+              <a:t>The logic here actually makes sense. If a reactive context produces an output, like a table, and key inputs to that process have changed, maybe our outputs are “outdated” and need refreshing, and the way to do that is to rerun the code that makes them. Make sense?</a:t>
             </a:r>
           </a:p>
           <a:p>
@@ -4950,13 +4954,8 @@
           <a:p>
             <a:r>
               <a:rPr lang="en-US" dirty="0"/>
-              <a:t>(Also demonstrate that we cannot put reactive objects somewhere other than inside </a:t>
-            </a:r>
-            <a:r>
-              <a:rPr lang="en-US"/>
-              <a:t>a reactive context. </a:t>
-            </a:r>
-            <a:endParaRPr lang="en-US" dirty="0"/>
+              <a:t>(Also demonstrate that we cannot put reactive objects somewhere other than inside a reactive context. </a:t>
+            </a:r>
           </a:p>
         </p:txBody>
       </p:sp>
@@ -5024,7 +5023,7 @@
           <a:p>
             <a:r>
               <a:rPr lang="en-US" dirty="0"/>
-              <a:t>I said earlier that R Shiny server code is going to feel pretty unfamiliar. I hope that you’re starting to see what I mean!</a:t>
+              <a:t>I said earlier that R Shiny server code might feel unfamiliar. I hope you’re seeing what I meant!</a:t>
             </a:r>
           </a:p>
           <a:p>
@@ -5036,13 +5035,13 @@
           <a:p>
             <a:r>
               <a:rPr lang="en-US" dirty="0"/>
-              <a:t>In R, we’re the user. We have needs, and we want R to meet those needs right now. </a:t>
-            </a:r>
-          </a:p>
-          <a:p>
-            <a:r>
-              <a:rPr lang="en-US" dirty="0"/>
-              <a:t>R has imperative evaluation. It runs code from top to bottom, as fast as it can, as soon as we ask it to. It’s the coding equivalent of us yelling, R, make me a sandwich this exact way, pronto! and it responding yes sir/</a:t>
+              <a:t>In R, we’re the user. We have needs, and we want R to meet those needs NOW. </a:t>
+            </a:r>
+          </a:p>
+          <a:p>
+            <a:r>
+              <a:rPr lang="en-US" dirty="0"/>
+              <a:t>R evaluates code imperatively for that reason. It runs code from top to bottom, as fast as it can, as soon as we ask it to. It’s the evaluation equivalent of us yelling, R, make me a sandwich this exact way, pronto! and it responding yes sir/</a:t>
             </a:r>
             <a:r>
               <a:rPr lang="en-US" dirty="0" err="1"/>
@@ -5068,7 +5067,7 @@
           <a:p>
             <a:r>
               <a:rPr lang="en-US" dirty="0"/>
-              <a:t>In line with all this, R Shiny server code evaluates </a:t>
+              <a:t>In line with this, R Shiny server code evaluates </a:t>
             </a:r>
             <a:r>
               <a:rPr lang="en-US" dirty="0" err="1"/>
@@ -5076,7 +5075,7 @@
             </a:r>
             <a:r>
               <a:rPr lang="en-US" dirty="0"/>
-              <a:t> instead. It waits until an event occurs and re-runs whichever reactive contexts are affected and only those. It’s the equivalent of saying (read what’s on the slide).</a:t>
+              <a:t> instead. It waits until an event occurs and re-runs whichever reactive contexts are affected and only those contexts. It’s the equivalent of saying (read what’s on the slide).</a:t>
             </a:r>
           </a:p>
           <a:p>
@@ -5151,6 +5150,490 @@
           <a:p>
             <a:r>
               <a:rPr lang="en-US" dirty="0"/>
+              <a:t>Now, you’ll notice that the way we’re handling our drop-down menu widget causes the table to rebuild every time a new choice is made. </a:t>
+            </a:r>
+          </a:p>
+          <a:p>
+            <a:r>
+              <a:rPr lang="en-US" dirty="0"/>
+              <a:t>This approach is ok because we only have one widget and rebuilding this table is really fast.</a:t>
+            </a:r>
+          </a:p>
+          <a:p>
+            <a:r>
+              <a:rPr lang="en-US" dirty="0"/>
+              <a:t>But if we had lots of widgets, or if rebuilding the table was slow, a user might want more say in </a:t>
+            </a:r>
+            <a:r>
+              <a:rPr lang="en-US" i="1" dirty="0"/>
+              <a:t>when</a:t>
+            </a:r>
+            <a:r>
+              <a:rPr lang="en-US" dirty="0"/>
+              <a:t> the table rebuilds so that, e.g., they could dial in all their selections before triggering the rebuild.</a:t>
+            </a:r>
+          </a:p>
+          <a:p>
+            <a:r>
+              <a:rPr lang="en-US" dirty="0"/>
+              <a:t>Let’s add a button widget to give them that power.</a:t>
+            </a:r>
+          </a:p>
+          <a:p>
+            <a:r>
+              <a:rPr lang="en-US" dirty="0"/>
+              <a:t>(Go off to R to do it). </a:t>
+            </a:r>
+          </a:p>
+          <a:p>
+            <a:r>
+              <a:rPr lang="en-US" dirty="0"/>
+              <a:t>We have our button, but we still need to handle its events. We want button presses to trigger a table rebuild, so let’s add </a:t>
+            </a:r>
+            <a:r>
+              <a:rPr lang="en-US" dirty="0" err="1"/>
+              <a:t>input$go_button</a:t>
+            </a:r>
+            <a:r>
+              <a:rPr lang="en-US" dirty="0"/>
+              <a:t> to our </a:t>
+            </a:r>
+            <a:r>
+              <a:rPr lang="en-US" dirty="0" err="1"/>
+              <a:t>renderTable</a:t>
+            </a:r>
+            <a:r>
+              <a:rPr lang="en-US" dirty="0"/>
+              <a:t>({})’s reactive context to get R to start watching it for events in the way we want (do that in R). </a:t>
+            </a:r>
+          </a:p>
+          <a:p>
+            <a:r>
+              <a:rPr lang="en-US" dirty="0"/>
+              <a:t>However, </a:t>
+            </a:r>
+            <a:r>
+              <a:rPr lang="en-US" dirty="0" err="1"/>
+              <a:t>input$sorted_column</a:t>
+            </a:r>
+            <a:r>
+              <a:rPr lang="en-US" dirty="0"/>
+              <a:t> is still in here too, so changing the menu will also still trigger a rebuild. And we can’t remove </a:t>
+            </a:r>
+            <a:r>
+              <a:rPr lang="en-US" dirty="0" err="1"/>
+              <a:t>input$sorted_column</a:t>
+            </a:r>
+            <a:r>
+              <a:rPr lang="en-US" dirty="0"/>
+              <a:t> because, if we did, we couldn’t use its value to influence how to sort the table. Are we stuck?</a:t>
+            </a:r>
+          </a:p>
+          <a:p>
+            <a:r>
+              <a:rPr lang="en-US" dirty="0"/>
+              <a:t>No. This is a time to use isolation.  The isolate function allows us to access a reactive object’s value for use in operations but prevents changes to that object from being considered an event. (Show them)</a:t>
+            </a:r>
+          </a:p>
+        </p:txBody>
+      </p:sp>
+    </p:spTree>
+    <p:extLst>
+      <p:ext uri="{BB962C8B-B14F-4D97-AF65-F5344CB8AC3E}">
+        <p14:creationId xmlns:p14="http://schemas.microsoft.com/office/powerpoint/2010/main" val="3719549489"/>
+      </p:ext>
+    </p:extLst>
+  </p:cSld>
+  <p:clrMapOvr>
+    <a:masterClrMapping/>
+  </p:clrMapOvr>
+</p:notes>
+</file>
+
+<file path=ppt/notesSlides/notesSlide43.xml><?xml version="1.0" encoding="utf-8"?>
+<p:notes xmlns:a="http://schemas.openxmlformats.org/drawingml/2006/main" xmlns:r="http://schemas.openxmlformats.org/officeDocument/2006/relationships" xmlns:p="http://schemas.openxmlformats.org/presentationml/2006/main">
+  <p:cSld>
+    <p:spTree>
+      <p:nvGrpSpPr>
+        <p:cNvPr id="1" name=""/>
+        <p:cNvGrpSpPr/>
+        <p:nvPr/>
+      </p:nvGrpSpPr>
+      <p:grpSpPr>
+        <a:xfrm>
+          <a:off x="0" y="0"/>
+          <a:ext cx="0" cy="0"/>
+          <a:chOff x="0" y="0"/>
+          <a:chExt cx="0" cy="0"/>
+        </a:xfrm>
+      </p:grpSpPr>
+      <p:sp>
+        <p:nvSpPr>
+          <p:cNvPr id="2" name="Slide Image Placeholder 1"/>
+          <p:cNvSpPr>
+            <a:spLocks noGrp="1" noRot="1" noChangeAspect="1"/>
+          </p:cNvSpPr>
+          <p:nvPr>
+            <p:ph type="sldImg"/>
+          </p:nvPr>
+        </p:nvSpPr>
+        <p:spPr>
+          <a:xfrm>
+            <a:off x="381000" y="685800"/>
+            <a:ext cx="6096000" cy="3429000"/>
+          </a:xfrm>
+        </p:spPr>
+      </p:sp>
+      <p:sp>
+        <p:nvSpPr>
+          <p:cNvPr id="3" name="Notes Placeholder 2"/>
+          <p:cNvSpPr>
+            <a:spLocks noGrp="1"/>
+          </p:cNvSpPr>
+          <p:nvPr>
+            <p:ph type="body" idx="1"/>
+          </p:nvPr>
+        </p:nvSpPr>
+        <p:spPr/>
+        <p:txBody>
+          <a:bodyPr/>
+          <a:lstStyle/>
+          <a:p>
+            <a:r>
+              <a:rPr lang="en-US" dirty="0"/>
+              <a:t>This situation is pretty simple—we have just two inputs, and we only needed to “silence” one with isolate to get the outcome we wanted. </a:t>
+            </a:r>
+          </a:p>
+          <a:p>
+            <a:r>
+              <a:rPr lang="en-US" dirty="0"/>
+              <a:t>If you have a much more complex situation, like one that would require a ton of isolating, there’s a cleaner option: </a:t>
+            </a:r>
+            <a:r>
+              <a:rPr lang="en-US" dirty="0" err="1"/>
+              <a:t>observeEvent</a:t>
+            </a:r>
+            <a:r>
+              <a:rPr lang="en-US" dirty="0"/>
+              <a:t>.</a:t>
+            </a:r>
+          </a:p>
+          <a:p>
+            <a:r>
+              <a:rPr lang="en-US" dirty="0" err="1"/>
+              <a:t>observeEvent</a:t>
+            </a:r>
+            <a:r>
+              <a:rPr lang="en-US" dirty="0"/>
+              <a:t> allows us to code up a “if exactly this happens, do exactly that” response to events. </a:t>
+            </a:r>
+          </a:p>
+          <a:p>
+            <a:r>
+              <a:rPr lang="en-US" dirty="0"/>
+              <a:t>(Go off and show them). </a:t>
+            </a:r>
+          </a:p>
+        </p:txBody>
+      </p:sp>
+    </p:spTree>
+    <p:extLst>
+      <p:ext uri="{BB962C8B-B14F-4D97-AF65-F5344CB8AC3E}">
+        <p14:creationId xmlns:p14="http://schemas.microsoft.com/office/powerpoint/2010/main" val="2313243417"/>
+      </p:ext>
+    </p:extLst>
+  </p:cSld>
+  <p:clrMapOvr>
+    <a:masterClrMapping/>
+  </p:clrMapOvr>
+</p:notes>
+</file>
+
+<file path=ppt/notesSlides/notesSlide44.xml><?xml version="1.0" encoding="utf-8"?>
+<p:notes xmlns:a="http://schemas.openxmlformats.org/drawingml/2006/main" xmlns:r="http://schemas.openxmlformats.org/officeDocument/2006/relationships" xmlns:p="http://schemas.openxmlformats.org/presentationml/2006/main">
+  <p:cSld>
+    <p:spTree>
+      <p:nvGrpSpPr>
+        <p:cNvPr id="1" name=""/>
+        <p:cNvGrpSpPr/>
+        <p:nvPr/>
+      </p:nvGrpSpPr>
+      <p:grpSpPr>
+        <a:xfrm>
+          <a:off x="0" y="0"/>
+          <a:ext cx="0" cy="0"/>
+          <a:chOff x="0" y="0"/>
+          <a:chExt cx="0" cy="0"/>
+        </a:xfrm>
+      </p:grpSpPr>
+      <p:sp>
+        <p:nvSpPr>
+          <p:cNvPr id="2" name="Slide Image Placeholder 1"/>
+          <p:cNvSpPr>
+            <a:spLocks noGrp="1" noRot="1" noChangeAspect="1"/>
+          </p:cNvSpPr>
+          <p:nvPr>
+            <p:ph type="sldImg"/>
+          </p:nvPr>
+        </p:nvSpPr>
+        <p:spPr>
+          <a:xfrm>
+            <a:off x="381000" y="685800"/>
+            <a:ext cx="6096000" cy="3429000"/>
+          </a:xfrm>
+        </p:spPr>
+      </p:sp>
+      <p:sp>
+        <p:nvSpPr>
+          <p:cNvPr id="3" name="Notes Placeholder 2"/>
+          <p:cNvSpPr>
+            <a:spLocks noGrp="1"/>
+          </p:cNvSpPr>
+          <p:nvPr>
+            <p:ph type="body" idx="1"/>
+          </p:nvPr>
+        </p:nvSpPr>
+        <p:spPr/>
+        <p:txBody>
+          <a:bodyPr/>
+          <a:lstStyle/>
+          <a:p>
+            <a:r>
+              <a:rPr lang="en-US" dirty="0"/>
+              <a:t>Notice that, with those changes, the app works exactly the same as before! These two approaches work the same.</a:t>
+            </a:r>
+          </a:p>
+          <a:p>
+            <a:r>
+              <a:rPr lang="en-US" dirty="0"/>
+              <a:t>However, the second is much more precise. It tells R, hey, listen for changes in this first expression and, when one happens, trigger the second expression.</a:t>
+            </a:r>
+          </a:p>
+          <a:p>
+            <a:r>
+              <a:rPr lang="en-US" dirty="0"/>
+              <a:t>Oh, and also, never execute the first expression, and never trigger </a:t>
+            </a:r>
+            <a:r>
+              <a:rPr lang="en-US" i="1" dirty="0"/>
+              <a:t>events</a:t>
+            </a:r>
+            <a:r>
+              <a:rPr lang="en-US" dirty="0"/>
+              <a:t> within the second expression.</a:t>
+            </a:r>
+          </a:p>
+          <a:p>
+            <a:r>
+              <a:rPr lang="en-US" dirty="0"/>
+              <a:t>It’s like the 1</a:t>
+            </a:r>
+            <a:r>
+              <a:rPr lang="en-US" baseline="30000" dirty="0"/>
+              <a:t>st</a:t>
+            </a:r>
+            <a:r>
+              <a:rPr lang="en-US" dirty="0"/>
+              <a:t> expression is on “mute”—it </a:t>
+            </a:r>
+            <a:r>
+              <a:rPr lang="en-US" i="1" dirty="0"/>
+              <a:t>can’t</a:t>
+            </a:r>
+            <a:r>
+              <a:rPr lang="en-US" dirty="0"/>
+              <a:t> do work or make outputs, it can only trigger events.</a:t>
+            </a:r>
+          </a:p>
+          <a:p>
+            <a:r>
+              <a:rPr lang="en-US" dirty="0"/>
+              <a:t>Meanwhile, the 2</a:t>
+            </a:r>
+            <a:r>
+              <a:rPr lang="en-US" baseline="30000" dirty="0"/>
+              <a:t>nd</a:t>
+            </a:r>
+            <a:r>
+              <a:rPr lang="en-US" dirty="0"/>
+              <a:t> expression is functionally isolated—it can only do work and make outputs and NOT trigger events. </a:t>
+            </a:r>
+          </a:p>
+          <a:p>
+            <a:r>
+              <a:rPr lang="en-US" dirty="0"/>
+              <a:t>So, we can watch just one specific thing and use as many reactive objects in the response as we want without needing isolate once. Hopefully, you can see how this would be useful! </a:t>
+            </a:r>
+          </a:p>
+        </p:txBody>
+      </p:sp>
+    </p:spTree>
+    <p:extLst>
+      <p:ext uri="{BB962C8B-B14F-4D97-AF65-F5344CB8AC3E}">
+        <p14:creationId xmlns:p14="http://schemas.microsoft.com/office/powerpoint/2010/main" val="3692080897"/>
+      </p:ext>
+    </p:extLst>
+  </p:cSld>
+  <p:clrMapOvr>
+    <a:masterClrMapping/>
+  </p:clrMapOvr>
+</p:notes>
+</file>
+
+<file path=ppt/notesSlides/notesSlide45.xml><?xml version="1.0" encoding="utf-8"?>
+<p:notes xmlns:a="http://schemas.openxmlformats.org/drawingml/2006/main" xmlns:r="http://schemas.openxmlformats.org/officeDocument/2006/relationships" xmlns:p="http://schemas.openxmlformats.org/presentationml/2006/main">
+  <p:cSld>
+    <p:spTree>
+      <p:nvGrpSpPr>
+        <p:cNvPr id="1" name=""/>
+        <p:cNvGrpSpPr/>
+        <p:nvPr/>
+      </p:nvGrpSpPr>
+      <p:grpSpPr>
+        <a:xfrm>
+          <a:off x="0" y="0"/>
+          <a:ext cx="0" cy="0"/>
+          <a:chOff x="0" y="0"/>
+          <a:chExt cx="0" cy="0"/>
+        </a:xfrm>
+      </p:grpSpPr>
+      <p:sp>
+        <p:nvSpPr>
+          <p:cNvPr id="2" name="Slide Image Placeholder 1"/>
+          <p:cNvSpPr>
+            <a:spLocks noGrp="1" noRot="1" noChangeAspect="1"/>
+          </p:cNvSpPr>
+          <p:nvPr>
+            <p:ph type="sldImg"/>
+          </p:nvPr>
+        </p:nvSpPr>
+        <p:spPr>
+          <a:xfrm>
+            <a:off x="381000" y="685800"/>
+            <a:ext cx="6096000" cy="3429000"/>
+          </a:xfrm>
+        </p:spPr>
+      </p:sp>
+      <p:sp>
+        <p:nvSpPr>
+          <p:cNvPr id="3" name="Notes Placeholder 2"/>
+          <p:cNvSpPr>
+            <a:spLocks noGrp="1"/>
+          </p:cNvSpPr>
+          <p:nvPr>
+            <p:ph type="body" idx="1"/>
+          </p:nvPr>
+        </p:nvSpPr>
+        <p:spPr/>
+        <p:txBody>
+          <a:bodyPr/>
+          <a:lstStyle/>
+          <a:p>
+            <a:r>
+              <a:rPr lang="en-US" dirty="0"/>
+              <a:t>At this point, we understand the core Shiny concepts of rendering and outputting, events and event handling, widgets, and reactivity, so we have all the conceptual tools we need to build incredible apps!</a:t>
+            </a:r>
+          </a:p>
+          <a:p>
+            <a:r>
+              <a:rPr lang="en-US" dirty="0"/>
+              <a:t>In the last hour, we’ll upgrade our table and add interactive maps and graphs. To keep our UI organized, though, let’s first split the main panel cell of our app into three tabs using the Shiny functions </a:t>
+            </a:r>
+            <a:r>
+              <a:rPr lang="en-US" dirty="0" err="1"/>
+              <a:t>tabsetPanel</a:t>
+            </a:r>
+            <a:r>
+              <a:rPr lang="en-US" dirty="0"/>
+              <a:t>() and </a:t>
+            </a:r>
+            <a:r>
+              <a:rPr lang="en-US" dirty="0" err="1"/>
+              <a:t>tabPanel</a:t>
+            </a:r>
+            <a:r>
+              <a:rPr lang="en-US" dirty="0"/>
+              <a:t>().</a:t>
+            </a:r>
+          </a:p>
+          <a:p>
+            <a:r>
+              <a:rPr lang="en-US" dirty="0"/>
+              <a:t>(Go off and do that, and show them).</a:t>
+            </a:r>
+          </a:p>
+          <a:p>
+            <a:r>
+              <a:rPr lang="en-US" dirty="0"/>
+              <a:t>Note that our latter two tabs are empty, but we’ll soon change that!</a:t>
+            </a:r>
+          </a:p>
+        </p:txBody>
+      </p:sp>
+    </p:spTree>
+    <p:extLst>
+      <p:ext uri="{BB962C8B-B14F-4D97-AF65-F5344CB8AC3E}">
+        <p14:creationId xmlns:p14="http://schemas.microsoft.com/office/powerpoint/2010/main" val="1141439824"/>
+      </p:ext>
+    </p:extLst>
+  </p:cSld>
+  <p:clrMapOvr>
+    <a:masterClrMapping/>
+  </p:clrMapOvr>
+</p:notes>
+</file>
+
+<file path=ppt/notesSlides/notesSlide46.xml><?xml version="1.0" encoding="utf-8"?>
+<p:notes xmlns:a="http://schemas.openxmlformats.org/drawingml/2006/main" xmlns:r="http://schemas.openxmlformats.org/officeDocument/2006/relationships" xmlns:p="http://schemas.openxmlformats.org/presentationml/2006/main">
+  <p:cSld>
+    <p:spTree>
+      <p:nvGrpSpPr>
+        <p:cNvPr id="1" name=""/>
+        <p:cNvGrpSpPr/>
+        <p:nvPr/>
+      </p:nvGrpSpPr>
+      <p:grpSpPr>
+        <a:xfrm>
+          <a:off x="0" y="0"/>
+          <a:ext cx="0" cy="0"/>
+          <a:chOff x="0" y="0"/>
+          <a:chExt cx="0" cy="0"/>
+        </a:xfrm>
+      </p:grpSpPr>
+      <p:sp>
+        <p:nvSpPr>
+          <p:cNvPr id="2" name="Slide Image Placeholder 1"/>
+          <p:cNvSpPr>
+            <a:spLocks noGrp="1" noRot="1" noChangeAspect="1"/>
+          </p:cNvSpPr>
+          <p:nvPr>
+            <p:ph type="sldImg"/>
+          </p:nvPr>
+        </p:nvSpPr>
+        <p:spPr>
+          <a:xfrm>
+            <a:off x="381000" y="685800"/>
+            <a:ext cx="6096000" cy="3429000"/>
+          </a:xfrm>
+        </p:spPr>
+      </p:sp>
+      <p:sp>
+        <p:nvSpPr>
+          <p:cNvPr id="3" name="Notes Placeholder 2"/>
+          <p:cNvSpPr>
+            <a:spLocks noGrp="1"/>
+          </p:cNvSpPr>
+          <p:nvPr>
+            <p:ph type="body" idx="1"/>
+          </p:nvPr>
+        </p:nvSpPr>
+        <p:spPr/>
+        <p:txBody>
+          <a:bodyPr/>
+          <a:lstStyle/>
+          <a:p>
+            <a:r>
+              <a:rPr lang="en-US" dirty="0"/>
               <a:t>In this final hour, my plan is to introduce you to three powerhouse packages that can turn a good Shiny app into a great one: DT, leaflet, and </a:t>
             </a:r>
             <a:r>
@@ -5209,7 +5692,7 @@
 </p:notes>
 </file>
 
-<file path=ppt/notesSlides/notesSlide43.xml><?xml version="1.0" encoding="utf-8"?>
+<file path=ppt/notesSlides/notesSlide47.xml><?xml version="1.0" encoding="utf-8"?>
 <p:notes xmlns:a="http://schemas.openxmlformats.org/drawingml/2006/main" xmlns:r="http://schemas.openxmlformats.org/officeDocument/2006/relationships" xmlns:p="http://schemas.openxmlformats.org/presentationml/2006/main" showMasterSp="0" showMasterPhAnim="0">
   <p:cSld>
     <p:spTree>
@@ -5313,7 +5796,7 @@
 </p:notes>
 </file>
 
-<file path=ppt/notesSlides/notesSlide44.xml><?xml version="1.0" encoding="utf-8"?>
+<file path=ppt/notesSlides/notesSlide48.xml><?xml version="1.0" encoding="utf-8"?>
 <p:notes xmlns:a="http://schemas.openxmlformats.org/drawingml/2006/main" xmlns:r="http://schemas.openxmlformats.org/officeDocument/2006/relationships" xmlns:p="http://schemas.openxmlformats.org/presentationml/2006/main" showMasterSp="0" showMasterPhAnim="0">
   <p:cSld>
     <p:spTree>
@@ -30518,7 +31001,7 @@
         <p:spPr/>
         <p:txBody>
           <a:bodyPr>
-            <a:normAutofit lnSpcReduction="10000"/>
+            <a:normAutofit/>
           </a:bodyPr>
           <a:lstStyle/>
           <a:p>
@@ -30529,7 +31012,7 @@
             </a:pPr>
             <a:r>
               <a:rPr lang="en-US" dirty="0"/>
-              <a:t>Our UI is boring! Apps are only as good as what they let users </a:t>
+              <a:t>Apps are best when they let users </a:t>
             </a:r>
             <a:r>
               <a:rPr lang="en-US" i="1" dirty="0"/>
@@ -30537,7 +31020,7 @@
             </a:r>
             <a:r>
               <a:rPr lang="en-US" dirty="0"/>
-              <a:t>. </a:t>
+              <a:t> fun stuff.</a:t>
             </a:r>
           </a:p>
           <a:p>
@@ -30548,7 +31031,7 @@
             </a:pPr>
             <a:r>
               <a:rPr lang="en-US" dirty="0"/>
-              <a:t>Let’s add a table displaying the </a:t>
+              <a:t>Let’s start with a table displaying the </a:t>
             </a:r>
             <a:r>
               <a:rPr lang="en-US" dirty="0" err="1"/>
@@ -30567,7 +31050,7 @@
             </a:pPr>
             <a:r>
               <a:rPr lang="en-US" dirty="0"/>
-              <a:t>A table is just boxes within boxes—HTML can make one!</a:t>
+              <a:t>A table is just boxes within boxes—perfect for HTML!</a:t>
             </a:r>
           </a:p>
           <a:p>
@@ -30578,7 +31061,7 @@
             </a:pPr>
             <a:r>
               <a:rPr lang="en-US" dirty="0"/>
-              <a:t>…But let’s make R do that tedious task.</a:t>
+              <a:t>…But let’s make R do the tedious task of building one.</a:t>
             </a:r>
           </a:p>
           <a:p>
@@ -30641,7 +31124,7 @@
             </a:pPr>
             <a:r>
               <a:rPr lang="en-US" dirty="0"/>
-              <a:t>Pass it to the UI into a specific spot by </a:t>
+              <a:t>Pass the product to the UI into a specific place by </a:t>
             </a:r>
             <a:r>
               <a:rPr lang="en-US" b="1" dirty="0"/>
@@ -30649,7 +31132,7 @@
             </a:r>
             <a:r>
               <a:rPr lang="en-US" dirty="0"/>
-              <a:t> it.</a:t>
+              <a:t> it there.</a:t>
             </a:r>
           </a:p>
         </p:txBody>
@@ -31248,7 +31731,18 @@
           <a:p>
             <a:r>
               <a:rPr lang="en-US" sz="2000" dirty="0"/>
-              <a:t>R code inside render*({}) = Recipe</a:t>
+              <a:t>R code inside render*({}) = </a:t>
+            </a:r>
+            <a:r>
+              <a:rPr lang="en-US" sz="2000" dirty="0">
+                <a:solidFill>
+                  <a:schemeClr val="tx1">
+                    <a:lumMod val="60000"/>
+                    <a:lumOff val="40000"/>
+                  </a:schemeClr>
+                </a:solidFill>
+              </a:rPr>
+              <a:t>Recipe</a:t>
             </a:r>
           </a:p>
         </p:txBody>
@@ -31324,7 +31818,18 @@
           <a:p>
             <a:r>
               <a:rPr lang="en-US" sz="2000" dirty="0"/>
-              <a:t>render*({}) = Chef</a:t>
+              <a:t>render*({}) = </a:t>
+            </a:r>
+            <a:r>
+              <a:rPr lang="en-US" sz="2000" dirty="0">
+                <a:solidFill>
+                  <a:schemeClr val="tx1">
+                    <a:lumMod val="60000"/>
+                    <a:lumOff val="40000"/>
+                  </a:schemeClr>
+                </a:solidFill>
+              </a:rPr>
+              <a:t>Chef</a:t>
             </a:r>
           </a:p>
         </p:txBody>
@@ -31395,7 +31900,29 @@
           <a:p>
             <a:r>
               <a:rPr lang="en-US" sz="2000" dirty="0"/>
-              <a:t>Final R object = Uncooked meal</a:t>
+              <a:t>Final R object = </a:t>
+            </a:r>
+            <a:r>
+              <a:rPr lang="en-US" sz="2000" i="1" dirty="0">
+                <a:solidFill>
+                  <a:schemeClr val="tx1">
+                    <a:lumMod val="60000"/>
+                    <a:lumOff val="40000"/>
+                  </a:schemeClr>
+                </a:solidFill>
+              </a:rPr>
+              <a:t>Uncooked</a:t>
+            </a:r>
+            <a:r>
+              <a:rPr lang="en-US" sz="2000" dirty="0">
+                <a:solidFill>
+                  <a:schemeClr val="tx1">
+                    <a:lumMod val="60000"/>
+                    <a:lumOff val="40000"/>
+                  </a:schemeClr>
+                </a:solidFill>
+              </a:rPr>
+              <a:t> meal</a:t>
             </a:r>
           </a:p>
         </p:txBody>
@@ -31430,7 +31957,18 @@
           <a:p>
             <a:r>
               <a:rPr lang="en-US" sz="2000" dirty="0"/>
-              <a:t>output = Waiter</a:t>
+              <a:t>output = </a:t>
+            </a:r>
+            <a:r>
+              <a:rPr lang="en-US" sz="2000" dirty="0">
+                <a:solidFill>
+                  <a:schemeClr val="tx1">
+                    <a:lumMod val="60000"/>
+                    <a:lumOff val="40000"/>
+                  </a:schemeClr>
+                </a:solidFill>
+              </a:rPr>
+              <a:t>Waiter</a:t>
             </a:r>
           </a:p>
         </p:txBody>
@@ -31505,7 +32043,18 @@
             </a:r>
             <a:r>
               <a:rPr lang="en-US" sz="2000" dirty="0"/>
-              <a:t> = Order ticket </a:t>
+              <a:t> = </a:t>
+            </a:r>
+            <a:r>
+              <a:rPr lang="en-US" sz="2000" dirty="0">
+                <a:solidFill>
+                  <a:schemeClr val="tx1">
+                    <a:lumMod val="60000"/>
+                    <a:lumOff val="40000"/>
+                  </a:schemeClr>
+                </a:solidFill>
+              </a:rPr>
+              <a:t>Order ticket </a:t>
             </a:r>
           </a:p>
         </p:txBody>
@@ -31641,7 +32190,29 @@
           <a:p>
             <a:r>
               <a:rPr lang="en-US" sz="2000" dirty="0"/>
-              <a:t>Rendered HTML object = Cooked meal</a:t>
+              <a:t>Rendered HTML object = </a:t>
+            </a:r>
+            <a:r>
+              <a:rPr lang="en-US" sz="2000" i="1" dirty="0">
+                <a:solidFill>
+                  <a:schemeClr val="tx1">
+                    <a:lumMod val="60000"/>
+                    <a:lumOff val="40000"/>
+                  </a:schemeClr>
+                </a:solidFill>
+              </a:rPr>
+              <a:t>Cooked</a:t>
+            </a:r>
+            <a:r>
+              <a:rPr lang="en-US" sz="2000" dirty="0">
+                <a:solidFill>
+                  <a:schemeClr val="tx1">
+                    <a:lumMod val="60000"/>
+                    <a:lumOff val="40000"/>
+                  </a:schemeClr>
+                </a:solidFill>
+              </a:rPr>
+              <a:t> meal</a:t>
             </a:r>
           </a:p>
         </p:txBody>
@@ -31712,7 +32283,18 @@
           <a:p>
             <a:r>
               <a:rPr lang="en-US" sz="2000" dirty="0"/>
-              <a:t>*Output() = Table</a:t>
+              <a:t>*Output() = </a:t>
+            </a:r>
+            <a:r>
+              <a:rPr lang="en-US" sz="2000" dirty="0">
+                <a:solidFill>
+                  <a:schemeClr val="tx1">
+                    <a:lumMod val="60000"/>
+                    <a:lumOff val="40000"/>
+                  </a:schemeClr>
+                </a:solidFill>
+              </a:rPr>
+              <a:t>Table</a:t>
             </a:r>
           </a:p>
         </p:txBody>
@@ -32449,7 +33031,7 @@
         <p:spPr/>
         <p:txBody>
           <a:bodyPr>
-            <a:normAutofit fontScale="85000" lnSpcReduction="10000"/>
+            <a:normAutofit fontScale="92500" lnSpcReduction="20000"/>
           </a:bodyPr>
           <a:lstStyle/>
           <a:p>
@@ -32460,7 +33042,7 @@
             </a:pPr>
             <a:r>
               <a:rPr lang="en-US" dirty="0"/>
-              <a:t>Our table looks a little drab, but, more importantly, it’s </a:t>
+              <a:t>Our table looks drab, but, more importantly, it’s </a:t>
             </a:r>
             <a:r>
               <a:rPr lang="en-US" b="1" dirty="0"/>
@@ -32495,7 +33077,7 @@
             </a:r>
             <a:r>
               <a:rPr lang="en-US" dirty="0"/>
-              <a:t> with this table—let’s add a drop-down menu </a:t>
+              <a:t> with it—let’s add a drop-down-menu-style </a:t>
             </a:r>
             <a:r>
               <a:rPr lang="en-US" b="1" dirty="0"/>
@@ -32514,7 +33096,7 @@
             </a:pPr>
             <a:r>
               <a:rPr lang="en-US" dirty="0"/>
-              <a:t>This widget will allow users to decide which column the table is sorted by. </a:t>
+              <a:t>This’ll allow users to decide which column the table is sorted by. </a:t>
             </a:r>
           </a:p>
           <a:p>
@@ -32581,7 +33163,7 @@
             </a:pPr>
             <a:r>
               <a:rPr lang="en-US" dirty="0"/>
-              <a:t>Use that current value inside a </a:t>
+              <a:t>Use that value inside a </a:t>
             </a:r>
             <a:r>
               <a:rPr lang="en-US" b="1" dirty="0"/>
@@ -33162,7 +33744,7 @@
             </a:r>
             <a:r>
               <a:rPr lang="en-US" dirty="0"/>
-              <a:t>. A nickname used to slap this widget’s current selection onto the </a:t>
+              <a:t>. A nickname used to slap this widget’s current value onto the </a:t>
             </a:r>
             <a:r>
               <a:rPr lang="en-US" b="1" dirty="0"/>
@@ -33178,7 +33760,7 @@
             </a:r>
             <a:r>
               <a:rPr lang="en-US" dirty="0"/>
-              <a:t>. </a:t>
+              <a:t> and pass it to the server.</a:t>
             </a:r>
           </a:p>
           <a:p>
@@ -33192,15 +33774,19 @@
             </a:pPr>
             <a:r>
               <a:rPr lang="en-US" dirty="0"/>
-              <a:t>VERY much like how the </a:t>
+              <a:t>VERY like how </a:t>
             </a:r>
             <a:r>
               <a:rPr lang="en-US" b="1" dirty="0" err="1"/>
               <a:t>outputId</a:t>
             </a:r>
             <a:r>
-              <a:rPr lang="en-US" dirty="0"/>
-              <a:t> was used to slap rendered outputs on the </a:t>
+              <a:rPr lang="en-US" dirty="0" err="1"/>
+              <a:t>s</a:t>
+            </a:r>
+            <a:r>
+              <a:rPr lang="en-US" dirty="0"/>
+              <a:t> are used to slap rendered outputs onto the </a:t>
             </a:r>
             <a:r>
               <a:rPr lang="en-US" b="1" dirty="0"/>
@@ -33208,7 +33794,7 @@
             </a:r>
             <a:r>
               <a:rPr lang="en-US" dirty="0"/>
-              <a:t> object </a:t>
+              <a:t> object to pass them to the UI </a:t>
             </a:r>
             <a:r>
               <a:rPr lang="en-US" dirty="0">
@@ -33239,7 +33825,7 @@
             </a:r>
             <a:r>
               <a:rPr lang="en-US" dirty="0"/>
-              <a:t>, a text go-with that you’ll generally use to describe what the widget does.</a:t>
+              <a:t>, a text go-with that’ll generally describe what the widget does.</a:t>
             </a:r>
           </a:p>
           <a:p>
@@ -33270,7 +33856,7 @@
             </a:pPr>
             <a:r>
               <a:rPr lang="en-US" dirty="0"/>
-              <a:t>Notice that our widget doesn’t actually do anything…we need to add the corresponding server code!</a:t>
+              <a:t>Notice that our widget doesn’t actually do anything when played with…we need to add the corresponding server code!</a:t>
             </a:r>
           </a:p>
         </p:txBody>
@@ -33933,7 +34519,7 @@
             </a:r>
             <a:r>
               <a:rPr lang="en-US" dirty="0"/>
-              <a:t>: Any action a user can take that the app might track.</a:t>
+              <a:t>: Any action a user can take the app might track.</a:t>
             </a:r>
           </a:p>
           <a:p>
@@ -33966,7 +34552,7 @@
             </a:r>
             <a:r>
               <a:rPr lang="en-US" i="1" dirty="0"/>
-              <a:t>respond</a:t>
+              <a:t>react</a:t>
             </a:r>
             <a:r>
               <a:rPr lang="en-US" dirty="0"/>
@@ -33984,7 +34570,7 @@
             </a:pPr>
             <a:r>
               <a:rPr lang="en-US" dirty="0"/>
-              <a:t>Ex: Our app resorts the table.</a:t>
+              <a:t>Ex: Our app re-sorts the table.</a:t>
             </a:r>
           </a:p>
           <a:p>
@@ -34021,7 +34607,7 @@
             </a:r>
             <a:r>
               <a:rPr lang="en-US" dirty="0"/>
-              <a:t>, which will change in value whenever the user selected a new choice.</a:t>
+              <a:t>, which will change in value whenever the user selects a new choice.</a:t>
             </a:r>
           </a:p>
           <a:p>
@@ -34036,7 +34622,7 @@
             </a:r>
             <a:r>
               <a:rPr lang="en-US" dirty="0"/>
-              <a:t>: A code block Shiny knows might contain reactive objects and handle events.</a:t>
+              <a:t>: A code block Shiny knows might contain reactive objects.</a:t>
             </a:r>
           </a:p>
           <a:p>
@@ -34070,6 +34656,24 @@
             </a:r>
           </a:p>
           <a:p>
+            <a:pPr lvl="1">
+              <a:lnSpc>
+                <a:spcPct val="120000"/>
+              </a:lnSpc>
+              <a:spcBef>
+                <a:spcPts val="0"/>
+              </a:spcBef>
+            </a:pPr>
+            <a:r>
+              <a:rPr lang="en-US" i="1" dirty="0"/>
+              <a:t>In general</a:t>
+            </a:r>
+            <a:r>
+              <a:rPr lang="en-US" dirty="0"/>
+              <a:t>, braces ( { … } ) mark reactive contexts in R Shiny server functions. </a:t>
+            </a:r>
+          </a:p>
+          <a:p>
             <a:pPr>
               <a:lnSpc>
                 <a:spcPct val="120000"/>
@@ -34085,7 +34689,7 @@
             </a:r>
             <a:r>
               <a:rPr lang="en-US" i="1" dirty="0"/>
-              <a:t>by re-running that entire reactive context</a:t>
+              <a:t>by re-running the entire reactive context</a:t>
             </a:r>
             <a:r>
               <a:rPr lang="en-US" dirty="0"/>
@@ -34252,30 +34856,21 @@
                             </p:childTnLst>
                           </p:cTn>
                         </p:par>
-                      </p:childTnLst>
-                    </p:cTn>
-                  </p:par>
-                  <p:par>
-                    <p:cTn id="13" fill="hold">
-                      <p:stCondLst>
-                        <p:cond delay="indefinite"/>
-                      </p:stCondLst>
-                      <p:childTnLst>
                         <p:par>
-                          <p:cTn id="14" fill="hold">
+                          <p:cTn id="13" fill="hold">
                             <p:stCondLst>
-                              <p:cond delay="0"/>
+                              <p:cond delay="500"/>
                             </p:stCondLst>
                             <p:childTnLst>
                               <p:par>
-                                <p:cTn id="15" presetID="10" presetClass="entr" presetSubtype="0" fill="hold" grpId="0" nodeType="clickEffect">
+                                <p:cTn id="14" presetID="10" presetClass="entr" presetSubtype="0" fill="hold" grpId="0" nodeType="afterEffect">
                                   <p:stCondLst>
                                     <p:cond delay="0"/>
                                   </p:stCondLst>
                                   <p:childTnLst>
                                     <p:set>
                                       <p:cBhvr>
-                                        <p:cTn id="16" dur="1" fill="hold">
+                                        <p:cTn id="15" dur="1" fill="hold">
                                           <p:stCondLst>
                                             <p:cond delay="0"/>
                                           </p:stCondLst>
@@ -34297,7 +34892,7 @@
                                     </p:set>
                                     <p:animEffect transition="in" filter="fade">
                                       <p:cBhvr>
-                                        <p:cTn id="17" dur="500"/>
+                                        <p:cTn id="16" dur="500"/>
                                         <p:tgtEl>
                                           <p:spTgt spid="3">
                                             <p:txEl>
@@ -34317,26 +34912,26 @@
                     </p:cTn>
                   </p:par>
                   <p:par>
-                    <p:cTn id="18" fill="hold">
+                    <p:cTn id="17" fill="hold">
                       <p:stCondLst>
                         <p:cond delay="indefinite"/>
                       </p:stCondLst>
                       <p:childTnLst>
                         <p:par>
-                          <p:cTn id="19" fill="hold">
+                          <p:cTn id="18" fill="hold">
                             <p:stCondLst>
                               <p:cond delay="0"/>
                             </p:stCondLst>
                             <p:childTnLst>
                               <p:par>
-                                <p:cTn id="20" presetID="10" presetClass="entr" presetSubtype="0" fill="hold" grpId="0" nodeType="clickEffect">
+                                <p:cTn id="19" presetID="10" presetClass="entr" presetSubtype="0" fill="hold" grpId="0" nodeType="clickEffect">
                                   <p:stCondLst>
                                     <p:cond delay="0"/>
                                   </p:stCondLst>
                                   <p:childTnLst>
                                     <p:set>
                                       <p:cBhvr>
-                                        <p:cTn id="21" dur="1" fill="hold">
+                                        <p:cTn id="20" dur="1" fill="hold">
                                           <p:stCondLst>
                                             <p:cond delay="0"/>
                                           </p:stCondLst>
@@ -34358,11 +34953,63 @@
                                     </p:set>
                                     <p:animEffect transition="in" filter="fade">
                                       <p:cBhvr>
-                                        <p:cTn id="22" dur="500"/>
+                                        <p:cTn id="21" dur="500"/>
                                         <p:tgtEl>
                                           <p:spTgt spid="3">
                                             <p:txEl>
                                               <p:pRg st="3" end="3"/>
+                                            </p:txEl>
+                                          </p:spTgt>
+                                        </p:tgtEl>
+                                      </p:cBhvr>
+                                    </p:animEffect>
+                                  </p:childTnLst>
+                                </p:cTn>
+                              </p:par>
+                            </p:childTnLst>
+                          </p:cTn>
+                        </p:par>
+                        <p:par>
+                          <p:cTn id="22" fill="hold">
+                            <p:stCondLst>
+                              <p:cond delay="500"/>
+                            </p:stCondLst>
+                            <p:childTnLst>
+                              <p:par>
+                                <p:cTn id="23" presetID="10" presetClass="entr" presetSubtype="0" fill="hold" grpId="0" nodeType="afterEffect">
+                                  <p:stCondLst>
+                                    <p:cond delay="0"/>
+                                  </p:stCondLst>
+                                  <p:childTnLst>
+                                    <p:set>
+                                      <p:cBhvr>
+                                        <p:cTn id="24" dur="1" fill="hold">
+                                          <p:stCondLst>
+                                            <p:cond delay="0"/>
+                                          </p:stCondLst>
+                                        </p:cTn>
+                                        <p:tgtEl>
+                                          <p:spTgt spid="3">
+                                            <p:txEl>
+                                              <p:pRg st="4" end="4"/>
+                                            </p:txEl>
+                                          </p:spTgt>
+                                        </p:tgtEl>
+                                        <p:attrNameLst>
+                                          <p:attrName>style.visibility</p:attrName>
+                                        </p:attrNameLst>
+                                      </p:cBhvr>
+                                      <p:to>
+                                        <p:strVal val="visible"/>
+                                      </p:to>
+                                    </p:set>
+                                    <p:animEffect transition="in" filter="fade">
+                                      <p:cBhvr>
+                                        <p:cTn id="25" dur="500"/>
+                                        <p:tgtEl>
+                                          <p:spTgt spid="3">
+                                            <p:txEl>
+                                              <p:pRg st="4" end="4"/>
                                             </p:txEl>
                                           </p:spTgt>
                                         </p:tgtEl>
@@ -34378,26 +35025,26 @@
                     </p:cTn>
                   </p:par>
                   <p:par>
-                    <p:cTn id="23" fill="hold">
+                    <p:cTn id="26" fill="hold">
                       <p:stCondLst>
                         <p:cond delay="indefinite"/>
                       </p:stCondLst>
                       <p:childTnLst>
                         <p:par>
-                          <p:cTn id="24" fill="hold">
+                          <p:cTn id="27" fill="hold">
                             <p:stCondLst>
                               <p:cond delay="0"/>
                             </p:stCondLst>
                             <p:childTnLst>
                               <p:par>
-                                <p:cTn id="25" presetID="10" presetClass="entr" presetSubtype="0" fill="hold" grpId="0" nodeType="clickEffect">
+                                <p:cTn id="28" presetID="10" presetClass="entr" presetSubtype="0" fill="hold" grpId="0" nodeType="clickEffect">
                                   <p:stCondLst>
                                     <p:cond delay="0"/>
                                   </p:stCondLst>
                                   <p:childTnLst>
                                     <p:set>
                                       <p:cBhvr>
-                                        <p:cTn id="26" dur="1" fill="hold">
+                                        <p:cTn id="29" dur="1" fill="hold">
                                           <p:stCondLst>
                                             <p:cond delay="0"/>
                                           </p:stCondLst>
@@ -34405,7 +35052,7 @@
                                         <p:tgtEl>
                                           <p:spTgt spid="3">
                                             <p:txEl>
-                                              <p:pRg st="4" end="4"/>
+                                              <p:pRg st="5" end="5"/>
                                             </p:txEl>
                                           </p:spTgt>
                                         </p:tgtEl>
@@ -34419,11 +35066,63 @@
                                     </p:set>
                                     <p:animEffect transition="in" filter="fade">
                                       <p:cBhvr>
-                                        <p:cTn id="27" dur="500"/>
+                                        <p:cTn id="30" dur="500"/>
                                         <p:tgtEl>
                                           <p:spTgt spid="3">
                                             <p:txEl>
-                                              <p:pRg st="4" end="4"/>
+                                              <p:pRg st="5" end="5"/>
+                                            </p:txEl>
+                                          </p:spTgt>
+                                        </p:tgtEl>
+                                      </p:cBhvr>
+                                    </p:animEffect>
+                                  </p:childTnLst>
+                                </p:cTn>
+                              </p:par>
+                            </p:childTnLst>
+                          </p:cTn>
+                        </p:par>
+                        <p:par>
+                          <p:cTn id="31" fill="hold">
+                            <p:stCondLst>
+                              <p:cond delay="500"/>
+                            </p:stCondLst>
+                            <p:childTnLst>
+                              <p:par>
+                                <p:cTn id="32" presetID="10" presetClass="entr" presetSubtype="0" fill="hold" grpId="0" nodeType="afterEffect">
+                                  <p:stCondLst>
+                                    <p:cond delay="0"/>
+                                  </p:stCondLst>
+                                  <p:childTnLst>
+                                    <p:set>
+                                      <p:cBhvr>
+                                        <p:cTn id="33" dur="1" fill="hold">
+                                          <p:stCondLst>
+                                            <p:cond delay="0"/>
+                                          </p:stCondLst>
+                                        </p:cTn>
+                                        <p:tgtEl>
+                                          <p:spTgt spid="3">
+                                            <p:txEl>
+                                              <p:pRg st="6" end="6"/>
+                                            </p:txEl>
+                                          </p:spTgt>
+                                        </p:tgtEl>
+                                        <p:attrNameLst>
+                                          <p:attrName>style.visibility</p:attrName>
+                                        </p:attrNameLst>
+                                      </p:cBhvr>
+                                      <p:to>
+                                        <p:strVal val="visible"/>
+                                      </p:to>
+                                    </p:set>
+                                    <p:animEffect transition="in" filter="fade">
+                                      <p:cBhvr>
+                                        <p:cTn id="34" dur="500"/>
+                                        <p:tgtEl>
+                                          <p:spTgt spid="3">
+                                            <p:txEl>
+                                              <p:pRg st="6" end="6"/>
                                             </p:txEl>
                                           </p:spTgt>
                                         </p:tgtEl>
@@ -34439,26 +35138,26 @@
                     </p:cTn>
                   </p:par>
                   <p:par>
-                    <p:cTn id="28" fill="hold">
+                    <p:cTn id="35" fill="hold">
                       <p:stCondLst>
                         <p:cond delay="indefinite"/>
                       </p:stCondLst>
                       <p:childTnLst>
                         <p:par>
-                          <p:cTn id="29" fill="hold">
+                          <p:cTn id="36" fill="hold">
                             <p:stCondLst>
                               <p:cond delay="0"/>
                             </p:stCondLst>
                             <p:childTnLst>
                               <p:par>
-                                <p:cTn id="30" presetID="10" presetClass="entr" presetSubtype="0" fill="hold" grpId="0" nodeType="clickEffect">
+                                <p:cTn id="37" presetID="10" presetClass="entr" presetSubtype="0" fill="hold" grpId="0" nodeType="clickEffect">
                                   <p:stCondLst>
                                     <p:cond delay="0"/>
                                   </p:stCondLst>
                                   <p:childTnLst>
                                     <p:set>
                                       <p:cBhvr>
-                                        <p:cTn id="31" dur="1" fill="hold">
+                                        <p:cTn id="38" dur="1" fill="hold">
                                           <p:stCondLst>
                                             <p:cond delay="0"/>
                                           </p:stCondLst>
@@ -34466,7 +35165,7 @@
                                         <p:tgtEl>
                                           <p:spTgt spid="3">
                                             <p:txEl>
-                                              <p:pRg st="5" end="5"/>
+                                              <p:pRg st="7" end="7"/>
                                             </p:txEl>
                                           </p:spTgt>
                                         </p:tgtEl>
@@ -34480,11 +35179,63 @@
                                     </p:set>
                                     <p:animEffect transition="in" filter="fade">
                                       <p:cBhvr>
-                                        <p:cTn id="32" dur="500"/>
+                                        <p:cTn id="39" dur="500"/>
                                         <p:tgtEl>
                                           <p:spTgt spid="3">
                                             <p:txEl>
-                                              <p:pRg st="5" end="5"/>
+                                              <p:pRg st="7" end="7"/>
+                                            </p:txEl>
+                                          </p:spTgt>
+                                        </p:tgtEl>
+                                      </p:cBhvr>
+                                    </p:animEffect>
+                                  </p:childTnLst>
+                                </p:cTn>
+                              </p:par>
+                            </p:childTnLst>
+                          </p:cTn>
+                        </p:par>
+                        <p:par>
+                          <p:cTn id="40" fill="hold">
+                            <p:stCondLst>
+                              <p:cond delay="500"/>
+                            </p:stCondLst>
+                            <p:childTnLst>
+                              <p:par>
+                                <p:cTn id="41" presetID="10" presetClass="entr" presetSubtype="0" fill="hold" grpId="0" nodeType="afterEffect">
+                                  <p:stCondLst>
+                                    <p:cond delay="0"/>
+                                  </p:stCondLst>
+                                  <p:childTnLst>
+                                    <p:set>
+                                      <p:cBhvr>
+                                        <p:cTn id="42" dur="1" fill="hold">
+                                          <p:stCondLst>
+                                            <p:cond delay="0"/>
+                                          </p:stCondLst>
+                                        </p:cTn>
+                                        <p:tgtEl>
+                                          <p:spTgt spid="3">
+                                            <p:txEl>
+                                              <p:pRg st="8" end="8"/>
+                                            </p:txEl>
+                                          </p:spTgt>
+                                        </p:tgtEl>
+                                        <p:attrNameLst>
+                                          <p:attrName>style.visibility</p:attrName>
+                                        </p:attrNameLst>
+                                      </p:cBhvr>
+                                      <p:to>
+                                        <p:strVal val="visible"/>
+                                      </p:to>
+                                    </p:set>
+                                    <p:animEffect transition="in" filter="fade">
+                                      <p:cBhvr>
+                                        <p:cTn id="43" dur="500"/>
+                                        <p:tgtEl>
+                                          <p:spTgt spid="3">
+                                            <p:txEl>
+                                              <p:pRg st="8" end="8"/>
                                             </p:txEl>
                                           </p:spTgt>
                                         </p:tgtEl>
@@ -34500,26 +35251,26 @@
                     </p:cTn>
                   </p:par>
                   <p:par>
-                    <p:cTn id="33" fill="hold">
+                    <p:cTn id="44" fill="hold">
                       <p:stCondLst>
                         <p:cond delay="indefinite"/>
                       </p:stCondLst>
                       <p:childTnLst>
                         <p:par>
-                          <p:cTn id="34" fill="hold">
+                          <p:cTn id="45" fill="hold">
                             <p:stCondLst>
                               <p:cond delay="0"/>
                             </p:stCondLst>
                             <p:childTnLst>
                               <p:par>
-                                <p:cTn id="35" presetID="10" presetClass="entr" presetSubtype="0" fill="hold" grpId="0" nodeType="clickEffect">
+                                <p:cTn id="46" presetID="10" presetClass="entr" presetSubtype="0" fill="hold" grpId="0" nodeType="clickEffect">
                                   <p:stCondLst>
                                     <p:cond delay="0"/>
                                   </p:stCondLst>
                                   <p:childTnLst>
                                     <p:set>
                                       <p:cBhvr>
-                                        <p:cTn id="36" dur="1" fill="hold">
+                                        <p:cTn id="47" dur="1" fill="hold">
                                           <p:stCondLst>
                                             <p:cond delay="0"/>
                                           </p:stCondLst>
@@ -34527,7 +35278,7 @@
                                         <p:tgtEl>
                                           <p:spTgt spid="3">
                                             <p:txEl>
-                                              <p:pRg st="6" end="6"/>
+                                              <p:pRg st="9" end="9"/>
                                             </p:txEl>
                                           </p:spTgt>
                                         </p:tgtEl>
@@ -34541,11 +35292,11 @@
                                     </p:set>
                                     <p:animEffect transition="in" filter="fade">
                                       <p:cBhvr>
-                                        <p:cTn id="37" dur="500"/>
+                                        <p:cTn id="48" dur="500"/>
                                         <p:tgtEl>
                                           <p:spTgt spid="3">
                                             <p:txEl>
-                                              <p:pRg st="6" end="6"/>
+                                              <p:pRg st="9" end="9"/>
                                             </p:txEl>
                                           </p:spTgt>
                                         </p:tgtEl>
@@ -34561,26 +35312,26 @@
                     </p:cTn>
                   </p:par>
                   <p:par>
-                    <p:cTn id="38" fill="hold">
+                    <p:cTn id="49" fill="hold">
                       <p:stCondLst>
                         <p:cond delay="indefinite"/>
                       </p:stCondLst>
                       <p:childTnLst>
                         <p:par>
-                          <p:cTn id="39" fill="hold">
+                          <p:cTn id="50" fill="hold">
                             <p:stCondLst>
                               <p:cond delay="0"/>
                             </p:stCondLst>
                             <p:childTnLst>
                               <p:par>
-                                <p:cTn id="40" presetID="10" presetClass="entr" presetSubtype="0" fill="hold" grpId="0" nodeType="clickEffect">
+                                <p:cTn id="51" presetID="10" presetClass="entr" presetSubtype="0" fill="hold" grpId="0" nodeType="clickEffect">
                                   <p:stCondLst>
                                     <p:cond delay="0"/>
                                   </p:stCondLst>
                                   <p:childTnLst>
                                     <p:set>
                                       <p:cBhvr>
-                                        <p:cTn id="41" dur="1" fill="hold">
+                                        <p:cTn id="52" dur="1" fill="hold">
                                           <p:stCondLst>
                                             <p:cond delay="0"/>
                                           </p:stCondLst>
@@ -34588,7 +35339,7 @@
                                         <p:tgtEl>
                                           <p:spTgt spid="3">
                                             <p:txEl>
-                                              <p:pRg st="7" end="7"/>
+                                              <p:pRg st="10" end="10"/>
                                             </p:txEl>
                                           </p:spTgt>
                                         </p:tgtEl>
@@ -34602,11 +35353,11 @@
                                     </p:set>
                                     <p:animEffect transition="in" filter="fade">
                                       <p:cBhvr>
-                                        <p:cTn id="42" dur="500"/>
+                                        <p:cTn id="53" dur="500"/>
                                         <p:tgtEl>
                                           <p:spTgt spid="3">
                                             <p:txEl>
-                                              <p:pRg st="7" end="7"/>
+                                              <p:pRg st="10" end="10"/>
                                             </p:txEl>
                                           </p:spTgt>
                                         </p:tgtEl>
@@ -34622,26 +35373,26 @@
                     </p:cTn>
                   </p:par>
                   <p:par>
-                    <p:cTn id="43" fill="hold">
+                    <p:cTn id="54" fill="hold">
                       <p:stCondLst>
                         <p:cond delay="indefinite"/>
                       </p:stCondLst>
                       <p:childTnLst>
                         <p:par>
-                          <p:cTn id="44" fill="hold">
+                          <p:cTn id="55" fill="hold">
                             <p:stCondLst>
                               <p:cond delay="0"/>
                             </p:stCondLst>
                             <p:childTnLst>
                               <p:par>
-                                <p:cTn id="45" presetID="10" presetClass="entr" presetSubtype="0" fill="hold" grpId="0" nodeType="clickEffect">
+                                <p:cTn id="56" presetID="10" presetClass="entr" presetSubtype="0" fill="hold" grpId="0" nodeType="clickEffect">
                                   <p:stCondLst>
                                     <p:cond delay="0"/>
                                   </p:stCondLst>
                                   <p:childTnLst>
                                     <p:set>
                                       <p:cBhvr>
-                                        <p:cTn id="46" dur="1" fill="hold">
+                                        <p:cTn id="57" dur="1" fill="hold">
                                           <p:stCondLst>
                                             <p:cond delay="0"/>
                                           </p:stCondLst>
@@ -34649,7 +35400,7 @@
                                         <p:tgtEl>
                                           <p:spTgt spid="3">
                                             <p:txEl>
-                                              <p:pRg st="8" end="8"/>
+                                              <p:pRg st="11" end="11"/>
                                             </p:txEl>
                                           </p:spTgt>
                                         </p:tgtEl>
@@ -34663,133 +35414,11 @@
                                     </p:set>
                                     <p:animEffect transition="in" filter="fade">
                                       <p:cBhvr>
-                                        <p:cTn id="47" dur="500"/>
+                                        <p:cTn id="58" dur="500"/>
                                         <p:tgtEl>
                                           <p:spTgt spid="3">
                                             <p:txEl>
-                                              <p:pRg st="8" end="8"/>
-                                            </p:txEl>
-                                          </p:spTgt>
-                                        </p:tgtEl>
-                                      </p:cBhvr>
-                                    </p:animEffect>
-                                  </p:childTnLst>
-                                </p:cTn>
-                              </p:par>
-                            </p:childTnLst>
-                          </p:cTn>
-                        </p:par>
-                      </p:childTnLst>
-                    </p:cTn>
-                  </p:par>
-                  <p:par>
-                    <p:cTn id="48" fill="hold">
-                      <p:stCondLst>
-                        <p:cond delay="indefinite"/>
-                      </p:stCondLst>
-                      <p:childTnLst>
-                        <p:par>
-                          <p:cTn id="49" fill="hold">
-                            <p:stCondLst>
-                              <p:cond delay="0"/>
-                            </p:stCondLst>
-                            <p:childTnLst>
-                              <p:par>
-                                <p:cTn id="50" presetID="10" presetClass="entr" presetSubtype="0" fill="hold" grpId="0" nodeType="clickEffect">
-                                  <p:stCondLst>
-                                    <p:cond delay="0"/>
-                                  </p:stCondLst>
-                                  <p:childTnLst>
-                                    <p:set>
-                                      <p:cBhvr>
-                                        <p:cTn id="51" dur="1" fill="hold">
-                                          <p:stCondLst>
-                                            <p:cond delay="0"/>
-                                          </p:stCondLst>
-                                        </p:cTn>
-                                        <p:tgtEl>
-                                          <p:spTgt spid="3">
-                                            <p:txEl>
-                                              <p:pRg st="9" end="9"/>
-                                            </p:txEl>
-                                          </p:spTgt>
-                                        </p:tgtEl>
-                                        <p:attrNameLst>
-                                          <p:attrName>style.visibility</p:attrName>
-                                        </p:attrNameLst>
-                                      </p:cBhvr>
-                                      <p:to>
-                                        <p:strVal val="visible"/>
-                                      </p:to>
-                                    </p:set>
-                                    <p:animEffect transition="in" filter="fade">
-                                      <p:cBhvr>
-                                        <p:cTn id="52" dur="500"/>
-                                        <p:tgtEl>
-                                          <p:spTgt spid="3">
-                                            <p:txEl>
-                                              <p:pRg st="9" end="9"/>
-                                            </p:txEl>
-                                          </p:spTgt>
-                                        </p:tgtEl>
-                                      </p:cBhvr>
-                                    </p:animEffect>
-                                  </p:childTnLst>
-                                </p:cTn>
-                              </p:par>
-                            </p:childTnLst>
-                          </p:cTn>
-                        </p:par>
-                      </p:childTnLst>
-                    </p:cTn>
-                  </p:par>
-                  <p:par>
-                    <p:cTn id="53" fill="hold">
-                      <p:stCondLst>
-                        <p:cond delay="indefinite"/>
-                      </p:stCondLst>
-                      <p:childTnLst>
-                        <p:par>
-                          <p:cTn id="54" fill="hold">
-                            <p:stCondLst>
-                              <p:cond delay="0"/>
-                            </p:stCondLst>
-                            <p:childTnLst>
-                              <p:par>
-                                <p:cTn id="55" presetID="10" presetClass="entr" presetSubtype="0" fill="hold" grpId="0" nodeType="clickEffect">
-                                  <p:stCondLst>
-                                    <p:cond delay="0"/>
-                                  </p:stCondLst>
-                                  <p:childTnLst>
-                                    <p:set>
-                                      <p:cBhvr>
-                                        <p:cTn id="56" dur="1" fill="hold">
-                                          <p:stCondLst>
-                                            <p:cond delay="0"/>
-                                          </p:stCondLst>
-                                        </p:cTn>
-                                        <p:tgtEl>
-                                          <p:spTgt spid="3">
-                                            <p:txEl>
-                                              <p:pRg st="10" end="10"/>
-                                            </p:txEl>
-                                          </p:spTgt>
-                                        </p:tgtEl>
-                                        <p:attrNameLst>
-                                          <p:attrName>style.visibility</p:attrName>
-                                        </p:attrNameLst>
-                                      </p:cBhvr>
-                                      <p:to>
-                                        <p:strVal val="visible"/>
-                                      </p:to>
-                                    </p:set>
-                                    <p:animEffect transition="in" filter="fade">
-                                      <p:cBhvr>
-                                        <p:cTn id="57" dur="500"/>
-                                        <p:tgtEl>
-                                          <p:spTgt spid="3">
-                                            <p:txEl>
-                                              <p:pRg st="10" end="10"/>
+                                              <p:pRg st="11" end="11"/>
                                             </p:txEl>
                                           </p:spTgt>
                                         </p:tgtEl>
@@ -34998,7 +35627,31 @@
             </a:r>
             <a:r>
               <a:rPr lang="en-US" dirty="0"/>
-              <a:t>: “R, whenever someone comes and wants a sandwich, use these general instructions to make it. Don’t do stuff unless and until you need to.”  </a:t>
+              <a:t>: “R, whenever someone comes and wants a sandwich, use these general instructions to make it using whatever inputs are relevant. Oh, and </a:t>
+            </a:r>
+            <a:r>
+              <a:rPr lang="en-US" i="1" dirty="0"/>
+              <a:t>don’t</a:t>
+            </a:r>
+            <a:r>
+              <a:rPr lang="en-US" dirty="0"/>
+              <a:t> do stuff </a:t>
+            </a:r>
+            <a:r>
+              <a:rPr lang="en-US" i="1" dirty="0"/>
+              <a:t>unless</a:t>
+            </a:r>
+            <a:r>
+              <a:rPr lang="en-US" dirty="0"/>
+              <a:t> and </a:t>
+            </a:r>
+            <a:r>
+              <a:rPr lang="en-US" i="1" dirty="0"/>
+              <a:t>until</a:t>
+            </a:r>
+            <a:r>
+              <a:rPr lang="en-US" dirty="0"/>
+              <a:t> needed.”  </a:t>
             </a:r>
           </a:p>
         </p:txBody>
@@ -35358,6 +36011,1648 @@
           <p:cNvPr id="2" name="Title 1">
             <a:extLst>
               <a:ext uri="{FF2B5EF4-FFF2-40B4-BE49-F238E27FC236}">
+                <a16:creationId xmlns:a16="http://schemas.microsoft.com/office/drawing/2014/main" id="{390F2388-5F99-873D-F994-A21FE6557641}"/>
+              </a:ext>
+            </a:extLst>
+          </p:cNvPr>
+          <p:cNvSpPr>
+            <a:spLocks noGrp="1"/>
+          </p:cNvSpPr>
+          <p:nvPr>
+            <p:ph type="title"/>
+          </p:nvPr>
+        </p:nvSpPr>
+        <p:spPr/>
+        <p:txBody>
+          <a:bodyPr/>
+          <a:lstStyle/>
+          <a:p>
+            <a:r>
+              <a:rPr lang="en-US" dirty="0"/>
+              <a:t>Button chops</a:t>
+            </a:r>
+          </a:p>
+        </p:txBody>
+      </p:sp>
+      <p:sp>
+        <p:nvSpPr>
+          <p:cNvPr id="3" name="Text Placeholder 2">
+            <a:extLst>
+              <a:ext uri="{FF2B5EF4-FFF2-40B4-BE49-F238E27FC236}">
+                <a16:creationId xmlns:a16="http://schemas.microsoft.com/office/drawing/2014/main" id="{70BF5300-AD15-E764-8FD6-4A4BC05A8341}"/>
+              </a:ext>
+            </a:extLst>
+          </p:cNvPr>
+          <p:cNvSpPr>
+            <a:spLocks noGrp="1"/>
+          </p:cNvSpPr>
+          <p:nvPr>
+            <p:ph type="body" idx="1"/>
+          </p:nvPr>
+        </p:nvSpPr>
+        <p:spPr/>
+        <p:txBody>
+          <a:bodyPr>
+            <a:normAutofit fontScale="85000" lnSpcReduction="10000"/>
+          </a:bodyPr>
+          <a:lstStyle/>
+          <a:p>
+            <a:r>
+              <a:rPr lang="en-US" dirty="0"/>
+              <a:t>Users may want more control over when the table updates, especially if they have lots of widgets to adjust.</a:t>
+            </a:r>
+          </a:p>
+          <a:p>
+            <a:r>
+              <a:rPr lang="en-US" dirty="0"/>
+              <a:t>Let’s give them a button widget—the table won’t update until it’s pressed.</a:t>
+            </a:r>
+          </a:p>
+          <a:p>
+            <a:pPr>
+              <a:lnSpc>
+                <a:spcPct val="110000"/>
+              </a:lnSpc>
+            </a:pPr>
+            <a:r>
+              <a:rPr lang="en-US" dirty="0"/>
+              <a:t>How should we </a:t>
+            </a:r>
+            <a:r>
+              <a:rPr lang="en-US" b="1" dirty="0"/>
+              <a:t>handle</a:t>
+            </a:r>
+            <a:r>
+              <a:rPr lang="en-US" dirty="0"/>
+              <a:t> button presses? </a:t>
+            </a:r>
+          </a:p>
+          <a:p>
+            <a:pPr lvl="1">
+              <a:lnSpc>
+                <a:spcPct val="110000"/>
+              </a:lnSpc>
+              <a:spcBef>
+                <a:spcPts val="0"/>
+              </a:spcBef>
+            </a:pPr>
+            <a:r>
+              <a:rPr lang="en-US" dirty="0"/>
+              <a:t>We want button presses to trigger rebuilds, but new selections in our drop-down menu should not.</a:t>
+            </a:r>
+          </a:p>
+          <a:p>
+            <a:pPr lvl="1">
+              <a:lnSpc>
+                <a:spcPct val="110000"/>
+              </a:lnSpc>
+              <a:spcBef>
+                <a:spcPts val="0"/>
+              </a:spcBef>
+            </a:pPr>
+            <a:r>
+              <a:rPr lang="en-US" dirty="0"/>
+              <a:t>But we still want to use the current menu selection to influence how the table rebuilds, when it does. </a:t>
+            </a:r>
+          </a:p>
+          <a:p>
+            <a:pPr>
+              <a:lnSpc>
+                <a:spcPct val="110000"/>
+              </a:lnSpc>
+            </a:pPr>
+            <a:r>
+              <a:rPr lang="en-US" dirty="0"/>
+              <a:t>This is a good time to use </a:t>
+            </a:r>
+            <a:r>
+              <a:rPr lang="en-US" b="1" dirty="0"/>
+              <a:t>isolation</a:t>
+            </a:r>
+            <a:r>
+              <a:rPr lang="en-US" dirty="0"/>
+              <a:t>. </a:t>
+            </a:r>
+          </a:p>
+          <a:p>
+            <a:pPr lvl="1">
+              <a:lnSpc>
+                <a:spcPct val="110000"/>
+              </a:lnSpc>
+              <a:spcBef>
+                <a:spcPts val="0"/>
+              </a:spcBef>
+            </a:pPr>
+            <a:r>
+              <a:rPr lang="en-US" dirty="0"/>
+              <a:t>isolate() allows use of a reactive object’s value but prevents event triggering.</a:t>
+            </a:r>
+          </a:p>
+        </p:txBody>
+      </p:sp>
+    </p:spTree>
+    <p:extLst>
+      <p:ext uri="{BB962C8B-B14F-4D97-AF65-F5344CB8AC3E}">
+        <p14:creationId xmlns:p14="http://schemas.microsoft.com/office/powerpoint/2010/main" val="3219504805"/>
+      </p:ext>
+    </p:extLst>
+  </p:cSld>
+  <p:clrMapOvr>
+    <a:masterClrMapping/>
+  </p:clrMapOvr>
+  <p:timing>
+    <p:tnLst>
+      <p:par>
+        <p:cTn id="1" dur="indefinite" restart="never" nodeType="tmRoot">
+          <p:childTnLst>
+            <p:seq concurrent="1" nextAc="seek">
+              <p:cTn id="2" dur="indefinite" nodeType="mainSeq">
+                <p:childTnLst>
+                  <p:par>
+                    <p:cTn id="3" fill="hold">
+                      <p:stCondLst>
+                        <p:cond delay="indefinite"/>
+                        <p:cond evt="onBegin" delay="0">
+                          <p:tn val="2"/>
+                        </p:cond>
+                      </p:stCondLst>
+                      <p:childTnLst>
+                        <p:par>
+                          <p:cTn id="4" fill="hold">
+                            <p:stCondLst>
+                              <p:cond delay="0"/>
+                            </p:stCondLst>
+                            <p:childTnLst>
+                              <p:par>
+                                <p:cTn id="5" presetID="10" presetClass="entr" presetSubtype="0" fill="hold" grpId="0" nodeType="afterEffect">
+                                  <p:stCondLst>
+                                    <p:cond delay="0"/>
+                                  </p:stCondLst>
+                                  <p:childTnLst>
+                                    <p:set>
+                                      <p:cBhvr>
+                                        <p:cTn id="6" dur="1" fill="hold">
+                                          <p:stCondLst>
+                                            <p:cond delay="0"/>
+                                          </p:stCondLst>
+                                        </p:cTn>
+                                        <p:tgtEl>
+                                          <p:spTgt spid="3">
+                                            <p:txEl>
+                                              <p:pRg st="0" end="0"/>
+                                            </p:txEl>
+                                          </p:spTgt>
+                                        </p:tgtEl>
+                                        <p:attrNameLst>
+                                          <p:attrName>style.visibility</p:attrName>
+                                        </p:attrNameLst>
+                                      </p:cBhvr>
+                                      <p:to>
+                                        <p:strVal val="visible"/>
+                                      </p:to>
+                                    </p:set>
+                                    <p:animEffect transition="in" filter="fade">
+                                      <p:cBhvr>
+                                        <p:cTn id="7" dur="500"/>
+                                        <p:tgtEl>
+                                          <p:spTgt spid="3">
+                                            <p:txEl>
+                                              <p:pRg st="0" end="0"/>
+                                            </p:txEl>
+                                          </p:spTgt>
+                                        </p:tgtEl>
+                                      </p:cBhvr>
+                                    </p:animEffect>
+                                  </p:childTnLst>
+                                </p:cTn>
+                              </p:par>
+                            </p:childTnLst>
+                          </p:cTn>
+                        </p:par>
+                      </p:childTnLst>
+                    </p:cTn>
+                  </p:par>
+                  <p:par>
+                    <p:cTn id="8" fill="hold">
+                      <p:stCondLst>
+                        <p:cond delay="indefinite"/>
+                      </p:stCondLst>
+                      <p:childTnLst>
+                        <p:par>
+                          <p:cTn id="9" fill="hold">
+                            <p:stCondLst>
+                              <p:cond delay="0"/>
+                            </p:stCondLst>
+                            <p:childTnLst>
+                              <p:par>
+                                <p:cTn id="10" presetID="10" presetClass="entr" presetSubtype="0" fill="hold" grpId="0" nodeType="clickEffect">
+                                  <p:stCondLst>
+                                    <p:cond delay="0"/>
+                                  </p:stCondLst>
+                                  <p:childTnLst>
+                                    <p:set>
+                                      <p:cBhvr>
+                                        <p:cTn id="11" dur="1" fill="hold">
+                                          <p:stCondLst>
+                                            <p:cond delay="0"/>
+                                          </p:stCondLst>
+                                        </p:cTn>
+                                        <p:tgtEl>
+                                          <p:spTgt spid="3">
+                                            <p:txEl>
+                                              <p:pRg st="1" end="1"/>
+                                            </p:txEl>
+                                          </p:spTgt>
+                                        </p:tgtEl>
+                                        <p:attrNameLst>
+                                          <p:attrName>style.visibility</p:attrName>
+                                        </p:attrNameLst>
+                                      </p:cBhvr>
+                                      <p:to>
+                                        <p:strVal val="visible"/>
+                                      </p:to>
+                                    </p:set>
+                                    <p:animEffect transition="in" filter="fade">
+                                      <p:cBhvr>
+                                        <p:cTn id="12" dur="500"/>
+                                        <p:tgtEl>
+                                          <p:spTgt spid="3">
+                                            <p:txEl>
+                                              <p:pRg st="1" end="1"/>
+                                            </p:txEl>
+                                          </p:spTgt>
+                                        </p:tgtEl>
+                                      </p:cBhvr>
+                                    </p:animEffect>
+                                  </p:childTnLst>
+                                </p:cTn>
+                              </p:par>
+                            </p:childTnLst>
+                          </p:cTn>
+                        </p:par>
+                      </p:childTnLst>
+                    </p:cTn>
+                  </p:par>
+                  <p:par>
+                    <p:cTn id="13" fill="hold">
+                      <p:stCondLst>
+                        <p:cond delay="indefinite"/>
+                      </p:stCondLst>
+                      <p:childTnLst>
+                        <p:par>
+                          <p:cTn id="14" fill="hold">
+                            <p:stCondLst>
+                              <p:cond delay="0"/>
+                            </p:stCondLst>
+                            <p:childTnLst>
+                              <p:par>
+                                <p:cTn id="15" presetID="10" presetClass="entr" presetSubtype="0" fill="hold" grpId="0" nodeType="clickEffect">
+                                  <p:stCondLst>
+                                    <p:cond delay="0"/>
+                                  </p:stCondLst>
+                                  <p:childTnLst>
+                                    <p:set>
+                                      <p:cBhvr>
+                                        <p:cTn id="16" dur="1" fill="hold">
+                                          <p:stCondLst>
+                                            <p:cond delay="0"/>
+                                          </p:stCondLst>
+                                        </p:cTn>
+                                        <p:tgtEl>
+                                          <p:spTgt spid="3">
+                                            <p:txEl>
+                                              <p:pRg st="2" end="2"/>
+                                            </p:txEl>
+                                          </p:spTgt>
+                                        </p:tgtEl>
+                                        <p:attrNameLst>
+                                          <p:attrName>style.visibility</p:attrName>
+                                        </p:attrNameLst>
+                                      </p:cBhvr>
+                                      <p:to>
+                                        <p:strVal val="visible"/>
+                                      </p:to>
+                                    </p:set>
+                                    <p:animEffect transition="in" filter="fade">
+                                      <p:cBhvr>
+                                        <p:cTn id="17" dur="500"/>
+                                        <p:tgtEl>
+                                          <p:spTgt spid="3">
+                                            <p:txEl>
+                                              <p:pRg st="2" end="2"/>
+                                            </p:txEl>
+                                          </p:spTgt>
+                                        </p:tgtEl>
+                                      </p:cBhvr>
+                                    </p:animEffect>
+                                  </p:childTnLst>
+                                </p:cTn>
+                              </p:par>
+                            </p:childTnLst>
+                          </p:cTn>
+                        </p:par>
+                        <p:par>
+                          <p:cTn id="18" fill="hold">
+                            <p:stCondLst>
+                              <p:cond delay="500"/>
+                            </p:stCondLst>
+                            <p:childTnLst>
+                              <p:par>
+                                <p:cTn id="19" presetID="10" presetClass="entr" presetSubtype="0" fill="hold" grpId="0" nodeType="afterEffect">
+                                  <p:stCondLst>
+                                    <p:cond delay="0"/>
+                                  </p:stCondLst>
+                                  <p:childTnLst>
+                                    <p:set>
+                                      <p:cBhvr>
+                                        <p:cTn id="20" dur="1" fill="hold">
+                                          <p:stCondLst>
+                                            <p:cond delay="0"/>
+                                          </p:stCondLst>
+                                        </p:cTn>
+                                        <p:tgtEl>
+                                          <p:spTgt spid="3">
+                                            <p:txEl>
+                                              <p:pRg st="3" end="3"/>
+                                            </p:txEl>
+                                          </p:spTgt>
+                                        </p:tgtEl>
+                                        <p:attrNameLst>
+                                          <p:attrName>style.visibility</p:attrName>
+                                        </p:attrNameLst>
+                                      </p:cBhvr>
+                                      <p:to>
+                                        <p:strVal val="visible"/>
+                                      </p:to>
+                                    </p:set>
+                                    <p:animEffect transition="in" filter="fade">
+                                      <p:cBhvr>
+                                        <p:cTn id="21" dur="500"/>
+                                        <p:tgtEl>
+                                          <p:spTgt spid="3">
+                                            <p:txEl>
+                                              <p:pRg st="3" end="3"/>
+                                            </p:txEl>
+                                          </p:spTgt>
+                                        </p:tgtEl>
+                                      </p:cBhvr>
+                                    </p:animEffect>
+                                  </p:childTnLst>
+                                </p:cTn>
+                              </p:par>
+                            </p:childTnLst>
+                          </p:cTn>
+                        </p:par>
+                      </p:childTnLst>
+                    </p:cTn>
+                  </p:par>
+                  <p:par>
+                    <p:cTn id="22" fill="hold">
+                      <p:stCondLst>
+                        <p:cond delay="indefinite"/>
+                      </p:stCondLst>
+                      <p:childTnLst>
+                        <p:par>
+                          <p:cTn id="23" fill="hold">
+                            <p:stCondLst>
+                              <p:cond delay="0"/>
+                            </p:stCondLst>
+                            <p:childTnLst>
+                              <p:par>
+                                <p:cTn id="24" presetID="10" presetClass="entr" presetSubtype="0" fill="hold" grpId="0" nodeType="clickEffect">
+                                  <p:stCondLst>
+                                    <p:cond delay="0"/>
+                                  </p:stCondLst>
+                                  <p:childTnLst>
+                                    <p:set>
+                                      <p:cBhvr>
+                                        <p:cTn id="25" dur="1" fill="hold">
+                                          <p:stCondLst>
+                                            <p:cond delay="0"/>
+                                          </p:stCondLst>
+                                        </p:cTn>
+                                        <p:tgtEl>
+                                          <p:spTgt spid="3">
+                                            <p:txEl>
+                                              <p:pRg st="4" end="4"/>
+                                            </p:txEl>
+                                          </p:spTgt>
+                                        </p:tgtEl>
+                                        <p:attrNameLst>
+                                          <p:attrName>style.visibility</p:attrName>
+                                        </p:attrNameLst>
+                                      </p:cBhvr>
+                                      <p:to>
+                                        <p:strVal val="visible"/>
+                                      </p:to>
+                                    </p:set>
+                                    <p:animEffect transition="in" filter="fade">
+                                      <p:cBhvr>
+                                        <p:cTn id="26" dur="500"/>
+                                        <p:tgtEl>
+                                          <p:spTgt spid="3">
+                                            <p:txEl>
+                                              <p:pRg st="4" end="4"/>
+                                            </p:txEl>
+                                          </p:spTgt>
+                                        </p:tgtEl>
+                                      </p:cBhvr>
+                                    </p:animEffect>
+                                  </p:childTnLst>
+                                </p:cTn>
+                              </p:par>
+                            </p:childTnLst>
+                          </p:cTn>
+                        </p:par>
+                      </p:childTnLst>
+                    </p:cTn>
+                  </p:par>
+                  <p:par>
+                    <p:cTn id="27" fill="hold">
+                      <p:stCondLst>
+                        <p:cond delay="indefinite"/>
+                      </p:stCondLst>
+                      <p:childTnLst>
+                        <p:par>
+                          <p:cTn id="28" fill="hold">
+                            <p:stCondLst>
+                              <p:cond delay="0"/>
+                            </p:stCondLst>
+                            <p:childTnLst>
+                              <p:par>
+                                <p:cTn id="29" presetID="10" presetClass="entr" presetSubtype="0" fill="hold" grpId="0" nodeType="clickEffect">
+                                  <p:stCondLst>
+                                    <p:cond delay="0"/>
+                                  </p:stCondLst>
+                                  <p:childTnLst>
+                                    <p:set>
+                                      <p:cBhvr>
+                                        <p:cTn id="30" dur="1" fill="hold">
+                                          <p:stCondLst>
+                                            <p:cond delay="0"/>
+                                          </p:stCondLst>
+                                        </p:cTn>
+                                        <p:tgtEl>
+                                          <p:spTgt spid="3">
+                                            <p:txEl>
+                                              <p:pRg st="5" end="5"/>
+                                            </p:txEl>
+                                          </p:spTgt>
+                                        </p:tgtEl>
+                                        <p:attrNameLst>
+                                          <p:attrName>style.visibility</p:attrName>
+                                        </p:attrNameLst>
+                                      </p:cBhvr>
+                                      <p:to>
+                                        <p:strVal val="visible"/>
+                                      </p:to>
+                                    </p:set>
+                                    <p:animEffect transition="in" filter="fade">
+                                      <p:cBhvr>
+                                        <p:cTn id="31" dur="500"/>
+                                        <p:tgtEl>
+                                          <p:spTgt spid="3">
+                                            <p:txEl>
+                                              <p:pRg st="5" end="5"/>
+                                            </p:txEl>
+                                          </p:spTgt>
+                                        </p:tgtEl>
+                                      </p:cBhvr>
+                                    </p:animEffect>
+                                  </p:childTnLst>
+                                </p:cTn>
+                              </p:par>
+                              <p:par>
+                                <p:cTn id="32" presetID="10" presetClass="entr" presetSubtype="0" fill="hold" grpId="0" nodeType="withEffect">
+                                  <p:stCondLst>
+                                    <p:cond delay="0"/>
+                                  </p:stCondLst>
+                                  <p:childTnLst>
+                                    <p:set>
+                                      <p:cBhvr>
+                                        <p:cTn id="33" dur="1" fill="hold">
+                                          <p:stCondLst>
+                                            <p:cond delay="0"/>
+                                          </p:stCondLst>
+                                        </p:cTn>
+                                        <p:tgtEl>
+                                          <p:spTgt spid="3">
+                                            <p:txEl>
+                                              <p:pRg st="6" end="6"/>
+                                            </p:txEl>
+                                          </p:spTgt>
+                                        </p:tgtEl>
+                                        <p:attrNameLst>
+                                          <p:attrName>style.visibility</p:attrName>
+                                        </p:attrNameLst>
+                                      </p:cBhvr>
+                                      <p:to>
+                                        <p:strVal val="visible"/>
+                                      </p:to>
+                                    </p:set>
+                                    <p:animEffect transition="in" filter="fade">
+                                      <p:cBhvr>
+                                        <p:cTn id="34" dur="500"/>
+                                        <p:tgtEl>
+                                          <p:spTgt spid="3">
+                                            <p:txEl>
+                                              <p:pRg st="6" end="6"/>
+                                            </p:txEl>
+                                          </p:spTgt>
+                                        </p:tgtEl>
+                                      </p:cBhvr>
+                                    </p:animEffect>
+                                  </p:childTnLst>
+                                </p:cTn>
+                              </p:par>
+                            </p:childTnLst>
+                          </p:cTn>
+                        </p:par>
+                      </p:childTnLst>
+                    </p:cTn>
+                  </p:par>
+                </p:childTnLst>
+              </p:cTn>
+              <p:prevCondLst>
+                <p:cond evt="onPrev" delay="0">
+                  <p:tgtEl>
+                    <p:sldTgt/>
+                  </p:tgtEl>
+                </p:cond>
+              </p:prevCondLst>
+              <p:nextCondLst>
+                <p:cond evt="onNext" delay="0">
+                  <p:tgtEl>
+                    <p:sldTgt/>
+                  </p:tgtEl>
+                </p:cond>
+              </p:nextCondLst>
+            </p:seq>
+          </p:childTnLst>
+        </p:cTn>
+      </p:par>
+    </p:tnLst>
+    <p:bldLst>
+      <p:bldP spid="3" grpId="0" uiExpand="1" build="p"/>
+    </p:bldLst>
+  </p:timing>
+</p:sld>
+</file>
+
+<file path=ppt/slides/slide43.xml><?xml version="1.0" encoding="utf-8"?>
+<p:sld xmlns:a="http://schemas.openxmlformats.org/drawingml/2006/main" xmlns:r="http://schemas.openxmlformats.org/officeDocument/2006/relationships" xmlns:p="http://schemas.openxmlformats.org/presentationml/2006/main">
+  <p:cSld>
+    <p:spTree>
+      <p:nvGrpSpPr>
+        <p:cNvPr id="1" name=""/>
+        <p:cNvGrpSpPr/>
+        <p:nvPr/>
+      </p:nvGrpSpPr>
+      <p:grpSpPr>
+        <a:xfrm>
+          <a:off x="0" y="0"/>
+          <a:ext cx="0" cy="0"/>
+          <a:chOff x="0" y="0"/>
+          <a:chExt cx="0" cy="0"/>
+        </a:xfrm>
+      </p:grpSpPr>
+      <p:sp>
+        <p:nvSpPr>
+          <p:cNvPr id="2" name="Title 1">
+            <a:extLst>
+              <a:ext uri="{FF2B5EF4-FFF2-40B4-BE49-F238E27FC236}">
+                <a16:creationId xmlns:a16="http://schemas.microsoft.com/office/drawing/2014/main" id="{7A28F7CD-F08E-0F9D-83DA-BF32E54A9C12}"/>
+              </a:ext>
+            </a:extLst>
+          </p:cNvPr>
+          <p:cNvSpPr>
+            <a:spLocks noGrp="1"/>
+          </p:cNvSpPr>
+          <p:nvPr>
+            <p:ph type="title"/>
+          </p:nvPr>
+        </p:nvSpPr>
+        <p:spPr/>
+        <p:txBody>
+          <a:bodyPr/>
+          <a:lstStyle/>
+          <a:p>
+            <a:r>
+              <a:rPr lang="en-US" dirty="0"/>
+              <a:t>Observe and report</a:t>
+            </a:r>
+          </a:p>
+        </p:txBody>
+      </p:sp>
+      <p:sp>
+        <p:nvSpPr>
+          <p:cNvPr id="3" name="Text Placeholder 2">
+            <a:extLst>
+              <a:ext uri="{FF2B5EF4-FFF2-40B4-BE49-F238E27FC236}">
+                <a16:creationId xmlns:a16="http://schemas.microsoft.com/office/drawing/2014/main" id="{5D7F91A4-78AF-075F-ED51-054009969C8D}"/>
+              </a:ext>
+            </a:extLst>
+          </p:cNvPr>
+          <p:cNvSpPr>
+            <a:spLocks noGrp="1"/>
+          </p:cNvSpPr>
+          <p:nvPr>
+            <p:ph type="body" idx="1"/>
+          </p:nvPr>
+        </p:nvSpPr>
+        <p:spPr/>
+        <p:txBody>
+          <a:bodyPr/>
+          <a:lstStyle/>
+          <a:p>
+            <a:r>
+              <a:rPr lang="en-US" dirty="0"/>
+              <a:t>Isolation works well in simple situations.</a:t>
+            </a:r>
+          </a:p>
+          <a:p>
+            <a:r>
+              <a:rPr lang="en-US" dirty="0"/>
+              <a:t>When there are </a:t>
+            </a:r>
+            <a:r>
+              <a:rPr lang="en-US" i="1" dirty="0"/>
+              <a:t>many</a:t>
+            </a:r>
+            <a:r>
+              <a:rPr lang="en-US" dirty="0"/>
+              <a:t> reactive objects needing isolation, though, it gets clunky!</a:t>
+            </a:r>
+          </a:p>
+          <a:p>
+            <a:r>
+              <a:rPr lang="en-US" dirty="0"/>
+              <a:t>If we want to code a “if [this], then [that]” response, it’s cleaner to use </a:t>
+            </a:r>
+            <a:r>
+              <a:rPr lang="en-US" dirty="0" err="1"/>
+              <a:t>observeEvent</a:t>
+            </a:r>
+            <a:r>
+              <a:rPr lang="en-US" dirty="0"/>
+              <a:t>({},{}). </a:t>
+            </a:r>
+          </a:p>
+        </p:txBody>
+      </p:sp>
+    </p:spTree>
+    <p:extLst>
+      <p:ext uri="{BB962C8B-B14F-4D97-AF65-F5344CB8AC3E}">
+        <p14:creationId xmlns:p14="http://schemas.microsoft.com/office/powerpoint/2010/main" val="3310946856"/>
+      </p:ext>
+    </p:extLst>
+  </p:cSld>
+  <p:clrMapOvr>
+    <a:masterClrMapping/>
+  </p:clrMapOvr>
+  <p:timing>
+    <p:tnLst>
+      <p:par>
+        <p:cTn id="1" dur="indefinite" restart="never" nodeType="tmRoot">
+          <p:childTnLst>
+            <p:seq concurrent="1" nextAc="seek">
+              <p:cTn id="2" dur="indefinite" nodeType="mainSeq">
+                <p:childTnLst>
+                  <p:par>
+                    <p:cTn id="3" fill="hold">
+                      <p:stCondLst>
+                        <p:cond delay="indefinite"/>
+                        <p:cond evt="onBegin" delay="0">
+                          <p:tn val="2"/>
+                        </p:cond>
+                      </p:stCondLst>
+                      <p:childTnLst>
+                        <p:par>
+                          <p:cTn id="4" fill="hold">
+                            <p:stCondLst>
+                              <p:cond delay="0"/>
+                            </p:stCondLst>
+                            <p:childTnLst>
+                              <p:par>
+                                <p:cTn id="5" presetID="10" presetClass="entr" presetSubtype="0" fill="hold" grpId="0" nodeType="afterEffect">
+                                  <p:stCondLst>
+                                    <p:cond delay="0"/>
+                                  </p:stCondLst>
+                                  <p:childTnLst>
+                                    <p:set>
+                                      <p:cBhvr>
+                                        <p:cTn id="6" dur="1" fill="hold">
+                                          <p:stCondLst>
+                                            <p:cond delay="0"/>
+                                          </p:stCondLst>
+                                        </p:cTn>
+                                        <p:tgtEl>
+                                          <p:spTgt spid="3">
+                                            <p:txEl>
+                                              <p:pRg st="0" end="0"/>
+                                            </p:txEl>
+                                          </p:spTgt>
+                                        </p:tgtEl>
+                                        <p:attrNameLst>
+                                          <p:attrName>style.visibility</p:attrName>
+                                        </p:attrNameLst>
+                                      </p:cBhvr>
+                                      <p:to>
+                                        <p:strVal val="visible"/>
+                                      </p:to>
+                                    </p:set>
+                                    <p:animEffect transition="in" filter="fade">
+                                      <p:cBhvr>
+                                        <p:cTn id="7" dur="500"/>
+                                        <p:tgtEl>
+                                          <p:spTgt spid="3">
+                                            <p:txEl>
+                                              <p:pRg st="0" end="0"/>
+                                            </p:txEl>
+                                          </p:spTgt>
+                                        </p:tgtEl>
+                                      </p:cBhvr>
+                                    </p:animEffect>
+                                  </p:childTnLst>
+                                </p:cTn>
+                              </p:par>
+                            </p:childTnLst>
+                          </p:cTn>
+                        </p:par>
+                        <p:par>
+                          <p:cTn id="8" fill="hold">
+                            <p:stCondLst>
+                              <p:cond delay="500"/>
+                            </p:stCondLst>
+                            <p:childTnLst>
+                              <p:par>
+                                <p:cTn id="9" presetID="10" presetClass="entr" presetSubtype="0" fill="hold" grpId="0" nodeType="afterEffect">
+                                  <p:stCondLst>
+                                    <p:cond delay="0"/>
+                                  </p:stCondLst>
+                                  <p:childTnLst>
+                                    <p:set>
+                                      <p:cBhvr>
+                                        <p:cTn id="10" dur="1" fill="hold">
+                                          <p:stCondLst>
+                                            <p:cond delay="0"/>
+                                          </p:stCondLst>
+                                        </p:cTn>
+                                        <p:tgtEl>
+                                          <p:spTgt spid="3">
+                                            <p:txEl>
+                                              <p:pRg st="1" end="1"/>
+                                            </p:txEl>
+                                          </p:spTgt>
+                                        </p:tgtEl>
+                                        <p:attrNameLst>
+                                          <p:attrName>style.visibility</p:attrName>
+                                        </p:attrNameLst>
+                                      </p:cBhvr>
+                                      <p:to>
+                                        <p:strVal val="visible"/>
+                                      </p:to>
+                                    </p:set>
+                                    <p:animEffect transition="in" filter="fade">
+                                      <p:cBhvr>
+                                        <p:cTn id="11" dur="500"/>
+                                        <p:tgtEl>
+                                          <p:spTgt spid="3">
+                                            <p:txEl>
+                                              <p:pRg st="1" end="1"/>
+                                            </p:txEl>
+                                          </p:spTgt>
+                                        </p:tgtEl>
+                                      </p:cBhvr>
+                                    </p:animEffect>
+                                  </p:childTnLst>
+                                </p:cTn>
+                              </p:par>
+                            </p:childTnLst>
+                          </p:cTn>
+                        </p:par>
+                        <p:par>
+                          <p:cTn id="12" fill="hold">
+                            <p:stCondLst>
+                              <p:cond delay="1000"/>
+                            </p:stCondLst>
+                            <p:childTnLst>
+                              <p:par>
+                                <p:cTn id="13" presetID="10" presetClass="entr" presetSubtype="0" fill="hold" grpId="0" nodeType="afterEffect">
+                                  <p:stCondLst>
+                                    <p:cond delay="0"/>
+                                  </p:stCondLst>
+                                  <p:childTnLst>
+                                    <p:set>
+                                      <p:cBhvr>
+                                        <p:cTn id="14" dur="1" fill="hold">
+                                          <p:stCondLst>
+                                            <p:cond delay="0"/>
+                                          </p:stCondLst>
+                                        </p:cTn>
+                                        <p:tgtEl>
+                                          <p:spTgt spid="3">
+                                            <p:txEl>
+                                              <p:pRg st="2" end="2"/>
+                                            </p:txEl>
+                                          </p:spTgt>
+                                        </p:tgtEl>
+                                        <p:attrNameLst>
+                                          <p:attrName>style.visibility</p:attrName>
+                                        </p:attrNameLst>
+                                      </p:cBhvr>
+                                      <p:to>
+                                        <p:strVal val="visible"/>
+                                      </p:to>
+                                    </p:set>
+                                    <p:animEffect transition="in" filter="fade">
+                                      <p:cBhvr>
+                                        <p:cTn id="15" dur="500"/>
+                                        <p:tgtEl>
+                                          <p:spTgt spid="3">
+                                            <p:txEl>
+                                              <p:pRg st="2" end="2"/>
+                                            </p:txEl>
+                                          </p:spTgt>
+                                        </p:tgtEl>
+                                      </p:cBhvr>
+                                    </p:animEffect>
+                                  </p:childTnLst>
+                                </p:cTn>
+                              </p:par>
+                            </p:childTnLst>
+                          </p:cTn>
+                        </p:par>
+                      </p:childTnLst>
+                    </p:cTn>
+                  </p:par>
+                </p:childTnLst>
+              </p:cTn>
+              <p:prevCondLst>
+                <p:cond evt="onPrev" delay="0">
+                  <p:tgtEl>
+                    <p:sldTgt/>
+                  </p:tgtEl>
+                </p:cond>
+              </p:prevCondLst>
+              <p:nextCondLst>
+                <p:cond evt="onNext" delay="0">
+                  <p:tgtEl>
+                    <p:sldTgt/>
+                  </p:tgtEl>
+                </p:cond>
+              </p:nextCondLst>
+            </p:seq>
+          </p:childTnLst>
+        </p:cTn>
+      </p:par>
+    </p:tnLst>
+    <p:bldLst>
+      <p:bldP spid="3" grpId="0" uiExpand="1" build="p"/>
+    </p:bldLst>
+  </p:timing>
+</p:sld>
+</file>
+
+<file path=ppt/slides/slide44.xml><?xml version="1.0" encoding="utf-8"?>
+<p:sld xmlns:a="http://schemas.openxmlformats.org/drawingml/2006/main" xmlns:r="http://schemas.openxmlformats.org/officeDocument/2006/relationships" xmlns:p="http://schemas.openxmlformats.org/presentationml/2006/main">
+  <p:cSld>
+    <p:spTree>
+      <p:nvGrpSpPr>
+        <p:cNvPr id="1" name=""/>
+        <p:cNvGrpSpPr/>
+        <p:nvPr/>
+      </p:nvGrpSpPr>
+      <p:grpSpPr>
+        <a:xfrm>
+          <a:off x="0" y="0"/>
+          <a:ext cx="0" cy="0"/>
+          <a:chOff x="0" y="0"/>
+          <a:chExt cx="0" cy="0"/>
+        </a:xfrm>
+      </p:grpSpPr>
+      <p:sp>
+        <p:nvSpPr>
+          <p:cNvPr id="2" name="Title 1">
+            <a:extLst>
+              <a:ext uri="{FF2B5EF4-FFF2-40B4-BE49-F238E27FC236}">
+                <a16:creationId xmlns:a16="http://schemas.microsoft.com/office/drawing/2014/main" id="{7A28F7CD-F08E-0F9D-83DA-BF32E54A9C12}"/>
+              </a:ext>
+            </a:extLst>
+          </p:cNvPr>
+          <p:cNvSpPr>
+            <a:spLocks noGrp="1"/>
+          </p:cNvSpPr>
+          <p:nvPr>
+            <p:ph type="title"/>
+          </p:nvPr>
+        </p:nvSpPr>
+        <p:spPr/>
+        <p:txBody>
+          <a:bodyPr/>
+          <a:lstStyle/>
+          <a:p>
+            <a:r>
+              <a:rPr lang="en-US" dirty="0"/>
+              <a:t>Observe and report II</a:t>
+            </a:r>
+          </a:p>
+        </p:txBody>
+      </p:sp>
+      <p:sp>
+        <p:nvSpPr>
+          <p:cNvPr id="3" name="Text Placeholder 2">
+            <a:extLst>
+              <a:ext uri="{FF2B5EF4-FFF2-40B4-BE49-F238E27FC236}">
+                <a16:creationId xmlns:a16="http://schemas.microsoft.com/office/drawing/2014/main" id="{5D7F91A4-78AF-075F-ED51-054009969C8D}"/>
+              </a:ext>
+            </a:extLst>
+          </p:cNvPr>
+          <p:cNvSpPr>
+            <a:spLocks noGrp="1"/>
+          </p:cNvSpPr>
+          <p:nvPr>
+            <p:ph type="body" idx="1"/>
+          </p:nvPr>
+        </p:nvSpPr>
+        <p:spPr/>
+        <p:txBody>
+          <a:bodyPr/>
+          <a:lstStyle/>
+          <a:p>
+            <a:r>
+              <a:rPr lang="en-US" dirty="0"/>
+              <a:t>Note that the app works the same as before; the two approaches are equivalent.</a:t>
+            </a:r>
+          </a:p>
+          <a:p>
+            <a:r>
+              <a:rPr lang="en-US" dirty="0"/>
+              <a:t>However, </a:t>
+            </a:r>
+            <a:r>
+              <a:rPr lang="en-US" dirty="0" err="1"/>
+              <a:t>observeEvent</a:t>
+            </a:r>
+            <a:r>
+              <a:rPr lang="en-US" dirty="0"/>
+              <a:t>({},{}) is more precise:</a:t>
+            </a:r>
+          </a:p>
+          <a:p>
+            <a:pPr lvl="1"/>
+            <a:r>
+              <a:rPr lang="en-US" dirty="0"/>
+              <a:t>“Hey R, if {first expression} changes, do {second expression}. Never </a:t>
+            </a:r>
+            <a:r>
+              <a:rPr lang="en-US" i="1" dirty="0"/>
+              <a:t>execute</a:t>
+            </a:r>
+            <a:r>
+              <a:rPr lang="en-US" dirty="0"/>
+              <a:t> the first expression, and never </a:t>
+            </a:r>
+            <a:r>
+              <a:rPr lang="en-US" i="1" dirty="0"/>
+              <a:t>trigger events </a:t>
+            </a:r>
+            <a:r>
+              <a:rPr lang="en-US" dirty="0"/>
+              <a:t>within the second expression.”</a:t>
+            </a:r>
+          </a:p>
+          <a:p>
+            <a:pPr lvl="1"/>
+            <a:r>
+              <a:rPr lang="en-US" dirty="0"/>
+              <a:t>It’s like expression 1 is on “mute,” and expression 2 is isolate()d!</a:t>
+            </a:r>
+          </a:p>
+        </p:txBody>
+      </p:sp>
+    </p:spTree>
+    <p:extLst>
+      <p:ext uri="{BB962C8B-B14F-4D97-AF65-F5344CB8AC3E}">
+        <p14:creationId xmlns:p14="http://schemas.microsoft.com/office/powerpoint/2010/main" val="1053887196"/>
+      </p:ext>
+    </p:extLst>
+  </p:cSld>
+  <p:clrMapOvr>
+    <a:masterClrMapping/>
+  </p:clrMapOvr>
+  <p:timing>
+    <p:tnLst>
+      <p:par>
+        <p:cTn id="1" dur="indefinite" restart="never" nodeType="tmRoot">
+          <p:childTnLst>
+            <p:seq concurrent="1" nextAc="seek">
+              <p:cTn id="2" dur="indefinite" nodeType="mainSeq">
+                <p:childTnLst>
+                  <p:par>
+                    <p:cTn id="3" fill="hold">
+                      <p:stCondLst>
+                        <p:cond delay="indefinite"/>
+                        <p:cond evt="onBegin" delay="0">
+                          <p:tn val="2"/>
+                        </p:cond>
+                      </p:stCondLst>
+                      <p:childTnLst>
+                        <p:par>
+                          <p:cTn id="4" fill="hold">
+                            <p:stCondLst>
+                              <p:cond delay="0"/>
+                            </p:stCondLst>
+                            <p:childTnLst>
+                              <p:par>
+                                <p:cTn id="5" presetID="10" presetClass="entr" presetSubtype="0" fill="hold" grpId="0" nodeType="afterEffect">
+                                  <p:stCondLst>
+                                    <p:cond delay="0"/>
+                                  </p:stCondLst>
+                                  <p:childTnLst>
+                                    <p:set>
+                                      <p:cBhvr>
+                                        <p:cTn id="6" dur="1" fill="hold">
+                                          <p:stCondLst>
+                                            <p:cond delay="0"/>
+                                          </p:stCondLst>
+                                        </p:cTn>
+                                        <p:tgtEl>
+                                          <p:spTgt spid="3">
+                                            <p:txEl>
+                                              <p:pRg st="0" end="0"/>
+                                            </p:txEl>
+                                          </p:spTgt>
+                                        </p:tgtEl>
+                                        <p:attrNameLst>
+                                          <p:attrName>style.visibility</p:attrName>
+                                        </p:attrNameLst>
+                                      </p:cBhvr>
+                                      <p:to>
+                                        <p:strVal val="visible"/>
+                                      </p:to>
+                                    </p:set>
+                                    <p:animEffect transition="in" filter="fade">
+                                      <p:cBhvr>
+                                        <p:cTn id="7" dur="500"/>
+                                        <p:tgtEl>
+                                          <p:spTgt spid="3">
+                                            <p:txEl>
+                                              <p:pRg st="0" end="0"/>
+                                            </p:txEl>
+                                          </p:spTgt>
+                                        </p:tgtEl>
+                                      </p:cBhvr>
+                                    </p:animEffect>
+                                  </p:childTnLst>
+                                </p:cTn>
+                              </p:par>
+                            </p:childTnLst>
+                          </p:cTn>
+                        </p:par>
+                      </p:childTnLst>
+                    </p:cTn>
+                  </p:par>
+                  <p:par>
+                    <p:cTn id="8" fill="hold">
+                      <p:stCondLst>
+                        <p:cond delay="indefinite"/>
+                      </p:stCondLst>
+                      <p:childTnLst>
+                        <p:par>
+                          <p:cTn id="9" fill="hold">
+                            <p:stCondLst>
+                              <p:cond delay="0"/>
+                            </p:stCondLst>
+                            <p:childTnLst>
+                              <p:par>
+                                <p:cTn id="10" presetID="10" presetClass="entr" presetSubtype="0" fill="hold" grpId="0" nodeType="clickEffect">
+                                  <p:stCondLst>
+                                    <p:cond delay="0"/>
+                                  </p:stCondLst>
+                                  <p:childTnLst>
+                                    <p:set>
+                                      <p:cBhvr>
+                                        <p:cTn id="11" dur="1" fill="hold">
+                                          <p:stCondLst>
+                                            <p:cond delay="0"/>
+                                          </p:stCondLst>
+                                        </p:cTn>
+                                        <p:tgtEl>
+                                          <p:spTgt spid="3">
+                                            <p:txEl>
+                                              <p:pRg st="1" end="1"/>
+                                            </p:txEl>
+                                          </p:spTgt>
+                                        </p:tgtEl>
+                                        <p:attrNameLst>
+                                          <p:attrName>style.visibility</p:attrName>
+                                        </p:attrNameLst>
+                                      </p:cBhvr>
+                                      <p:to>
+                                        <p:strVal val="visible"/>
+                                      </p:to>
+                                    </p:set>
+                                    <p:animEffect transition="in" filter="fade">
+                                      <p:cBhvr>
+                                        <p:cTn id="12" dur="500"/>
+                                        <p:tgtEl>
+                                          <p:spTgt spid="3">
+                                            <p:txEl>
+                                              <p:pRg st="1" end="1"/>
+                                            </p:txEl>
+                                          </p:spTgt>
+                                        </p:tgtEl>
+                                      </p:cBhvr>
+                                    </p:animEffect>
+                                  </p:childTnLst>
+                                </p:cTn>
+                              </p:par>
+                            </p:childTnLst>
+                          </p:cTn>
+                        </p:par>
+                        <p:par>
+                          <p:cTn id="13" fill="hold">
+                            <p:stCondLst>
+                              <p:cond delay="500"/>
+                            </p:stCondLst>
+                            <p:childTnLst>
+                              <p:par>
+                                <p:cTn id="14" presetID="10" presetClass="entr" presetSubtype="0" fill="hold" grpId="0" nodeType="afterEffect">
+                                  <p:stCondLst>
+                                    <p:cond delay="0"/>
+                                  </p:stCondLst>
+                                  <p:childTnLst>
+                                    <p:set>
+                                      <p:cBhvr>
+                                        <p:cTn id="15" dur="1" fill="hold">
+                                          <p:stCondLst>
+                                            <p:cond delay="0"/>
+                                          </p:stCondLst>
+                                        </p:cTn>
+                                        <p:tgtEl>
+                                          <p:spTgt spid="3">
+                                            <p:txEl>
+                                              <p:pRg st="2" end="2"/>
+                                            </p:txEl>
+                                          </p:spTgt>
+                                        </p:tgtEl>
+                                        <p:attrNameLst>
+                                          <p:attrName>style.visibility</p:attrName>
+                                        </p:attrNameLst>
+                                      </p:cBhvr>
+                                      <p:to>
+                                        <p:strVal val="visible"/>
+                                      </p:to>
+                                    </p:set>
+                                    <p:animEffect transition="in" filter="fade">
+                                      <p:cBhvr>
+                                        <p:cTn id="16" dur="500"/>
+                                        <p:tgtEl>
+                                          <p:spTgt spid="3">
+                                            <p:txEl>
+                                              <p:pRg st="2" end="2"/>
+                                            </p:txEl>
+                                          </p:spTgt>
+                                        </p:tgtEl>
+                                      </p:cBhvr>
+                                    </p:animEffect>
+                                  </p:childTnLst>
+                                </p:cTn>
+                              </p:par>
+                            </p:childTnLst>
+                          </p:cTn>
+                        </p:par>
+                      </p:childTnLst>
+                    </p:cTn>
+                  </p:par>
+                  <p:par>
+                    <p:cTn id="17" fill="hold">
+                      <p:stCondLst>
+                        <p:cond delay="indefinite"/>
+                      </p:stCondLst>
+                      <p:childTnLst>
+                        <p:par>
+                          <p:cTn id="18" fill="hold">
+                            <p:stCondLst>
+                              <p:cond delay="0"/>
+                            </p:stCondLst>
+                            <p:childTnLst>
+                              <p:par>
+                                <p:cTn id="19" presetID="10" presetClass="entr" presetSubtype="0" fill="hold" grpId="0" nodeType="clickEffect">
+                                  <p:stCondLst>
+                                    <p:cond delay="0"/>
+                                  </p:stCondLst>
+                                  <p:childTnLst>
+                                    <p:set>
+                                      <p:cBhvr>
+                                        <p:cTn id="20" dur="1" fill="hold">
+                                          <p:stCondLst>
+                                            <p:cond delay="0"/>
+                                          </p:stCondLst>
+                                        </p:cTn>
+                                        <p:tgtEl>
+                                          <p:spTgt spid="3">
+                                            <p:txEl>
+                                              <p:pRg st="3" end="3"/>
+                                            </p:txEl>
+                                          </p:spTgt>
+                                        </p:tgtEl>
+                                        <p:attrNameLst>
+                                          <p:attrName>style.visibility</p:attrName>
+                                        </p:attrNameLst>
+                                      </p:cBhvr>
+                                      <p:to>
+                                        <p:strVal val="visible"/>
+                                      </p:to>
+                                    </p:set>
+                                    <p:animEffect transition="in" filter="fade">
+                                      <p:cBhvr>
+                                        <p:cTn id="21" dur="500"/>
+                                        <p:tgtEl>
+                                          <p:spTgt spid="3">
+                                            <p:txEl>
+                                              <p:pRg st="3" end="3"/>
+                                            </p:txEl>
+                                          </p:spTgt>
+                                        </p:tgtEl>
+                                      </p:cBhvr>
+                                    </p:animEffect>
+                                  </p:childTnLst>
+                                </p:cTn>
+                              </p:par>
+                            </p:childTnLst>
+                          </p:cTn>
+                        </p:par>
+                      </p:childTnLst>
+                    </p:cTn>
+                  </p:par>
+                </p:childTnLst>
+              </p:cTn>
+              <p:prevCondLst>
+                <p:cond evt="onPrev" delay="0">
+                  <p:tgtEl>
+                    <p:sldTgt/>
+                  </p:tgtEl>
+                </p:cond>
+              </p:prevCondLst>
+              <p:nextCondLst>
+                <p:cond evt="onNext" delay="0">
+                  <p:tgtEl>
+                    <p:sldTgt/>
+                  </p:tgtEl>
+                </p:cond>
+              </p:nextCondLst>
+            </p:seq>
+          </p:childTnLst>
+        </p:cTn>
+      </p:par>
+    </p:tnLst>
+    <p:bldLst>
+      <p:bldP spid="3" grpId="0" uiExpand="1" build="p"/>
+    </p:bldLst>
+  </p:timing>
+</p:sld>
+</file>
+
+<file path=ppt/slides/slide45.xml><?xml version="1.0" encoding="utf-8"?>
+<p:sld xmlns:a="http://schemas.openxmlformats.org/drawingml/2006/main" xmlns:r="http://schemas.openxmlformats.org/officeDocument/2006/relationships" xmlns:p="http://schemas.openxmlformats.org/presentationml/2006/main">
+  <p:cSld>
+    <p:spTree>
+      <p:nvGrpSpPr>
+        <p:cNvPr id="1" name=""/>
+        <p:cNvGrpSpPr/>
+        <p:nvPr/>
+      </p:nvGrpSpPr>
+      <p:grpSpPr>
+        <a:xfrm>
+          <a:off x="0" y="0"/>
+          <a:ext cx="0" cy="0"/>
+          <a:chOff x="0" y="0"/>
+          <a:chExt cx="0" cy="0"/>
+        </a:xfrm>
+      </p:grpSpPr>
+      <p:sp>
+        <p:nvSpPr>
+          <p:cNvPr id="2" name="Title 1">
+            <a:extLst>
+              <a:ext uri="{FF2B5EF4-FFF2-40B4-BE49-F238E27FC236}">
+                <a16:creationId xmlns:a16="http://schemas.microsoft.com/office/drawing/2014/main" id="{0A6900D4-22D8-7C42-47F9-689E51F93DDC}"/>
+              </a:ext>
+            </a:extLst>
+          </p:cNvPr>
+          <p:cNvSpPr>
+            <a:spLocks noGrp="1"/>
+          </p:cNvSpPr>
+          <p:nvPr>
+            <p:ph type="title"/>
+          </p:nvPr>
+        </p:nvSpPr>
+        <p:spPr/>
+        <p:txBody>
+          <a:bodyPr/>
+          <a:lstStyle/>
+          <a:p>
+            <a:r>
+              <a:rPr lang="en-US" dirty="0"/>
+              <a:t>Tabby cats</a:t>
+            </a:r>
+          </a:p>
+        </p:txBody>
+      </p:sp>
+      <p:sp>
+        <p:nvSpPr>
+          <p:cNvPr id="3" name="Text Placeholder 2">
+            <a:extLst>
+              <a:ext uri="{FF2B5EF4-FFF2-40B4-BE49-F238E27FC236}">
+                <a16:creationId xmlns:a16="http://schemas.microsoft.com/office/drawing/2014/main" id="{12CB628F-4329-27BA-6EDE-3203652125DF}"/>
+              </a:ext>
+            </a:extLst>
+          </p:cNvPr>
+          <p:cNvSpPr>
+            <a:spLocks noGrp="1"/>
+          </p:cNvSpPr>
+          <p:nvPr>
+            <p:ph type="body" idx="1"/>
+          </p:nvPr>
+        </p:nvSpPr>
+        <p:spPr/>
+        <p:txBody>
+          <a:bodyPr/>
+          <a:lstStyle/>
+          <a:p>
+            <a:r>
+              <a:rPr lang="en-US" dirty="0"/>
+              <a:t>In the last hour, we’ll make an upgraded table and add a graph and map. </a:t>
+            </a:r>
+          </a:p>
+          <a:p>
+            <a:r>
+              <a:rPr lang="en-US" dirty="0"/>
+              <a:t>Let’s create spaces in our UI for these using a </a:t>
+            </a:r>
+            <a:r>
+              <a:rPr lang="en-US" dirty="0" err="1"/>
+              <a:t>tabsetPanel</a:t>
+            </a:r>
+            <a:r>
+              <a:rPr lang="en-US" dirty="0"/>
+              <a:t> to create three tabs, one for each new element.</a:t>
+            </a:r>
+          </a:p>
+          <a:p>
+            <a:r>
+              <a:rPr lang="en-US" dirty="0"/>
+              <a:t>Note that the latter two tabs are empty, but not for long!</a:t>
+            </a:r>
+          </a:p>
+        </p:txBody>
+      </p:sp>
+    </p:spTree>
+    <p:extLst>
+      <p:ext uri="{BB962C8B-B14F-4D97-AF65-F5344CB8AC3E}">
+        <p14:creationId xmlns:p14="http://schemas.microsoft.com/office/powerpoint/2010/main" val="3016651032"/>
+      </p:ext>
+    </p:extLst>
+  </p:cSld>
+  <p:clrMapOvr>
+    <a:masterClrMapping/>
+  </p:clrMapOvr>
+  <p:timing>
+    <p:tnLst>
+      <p:par>
+        <p:cTn id="1" dur="indefinite" restart="never" nodeType="tmRoot">
+          <p:childTnLst>
+            <p:seq concurrent="1" nextAc="seek">
+              <p:cTn id="2" dur="indefinite" nodeType="mainSeq">
+                <p:childTnLst>
+                  <p:par>
+                    <p:cTn id="3" fill="hold">
+                      <p:stCondLst>
+                        <p:cond delay="indefinite"/>
+                        <p:cond evt="onBegin" delay="0">
+                          <p:tn val="2"/>
+                        </p:cond>
+                      </p:stCondLst>
+                      <p:childTnLst>
+                        <p:par>
+                          <p:cTn id="4" fill="hold">
+                            <p:stCondLst>
+                              <p:cond delay="0"/>
+                            </p:stCondLst>
+                            <p:childTnLst>
+                              <p:par>
+                                <p:cTn id="5" presetID="10" presetClass="entr" presetSubtype="0" fill="hold" grpId="0" nodeType="afterEffect">
+                                  <p:stCondLst>
+                                    <p:cond delay="0"/>
+                                  </p:stCondLst>
+                                  <p:childTnLst>
+                                    <p:set>
+                                      <p:cBhvr>
+                                        <p:cTn id="6" dur="1" fill="hold">
+                                          <p:stCondLst>
+                                            <p:cond delay="0"/>
+                                          </p:stCondLst>
+                                        </p:cTn>
+                                        <p:tgtEl>
+                                          <p:spTgt spid="3">
+                                            <p:txEl>
+                                              <p:pRg st="0" end="0"/>
+                                            </p:txEl>
+                                          </p:spTgt>
+                                        </p:tgtEl>
+                                        <p:attrNameLst>
+                                          <p:attrName>style.visibility</p:attrName>
+                                        </p:attrNameLst>
+                                      </p:cBhvr>
+                                      <p:to>
+                                        <p:strVal val="visible"/>
+                                      </p:to>
+                                    </p:set>
+                                    <p:animEffect transition="in" filter="fade">
+                                      <p:cBhvr>
+                                        <p:cTn id="7" dur="500"/>
+                                        <p:tgtEl>
+                                          <p:spTgt spid="3">
+                                            <p:txEl>
+                                              <p:pRg st="0" end="0"/>
+                                            </p:txEl>
+                                          </p:spTgt>
+                                        </p:tgtEl>
+                                      </p:cBhvr>
+                                    </p:animEffect>
+                                  </p:childTnLst>
+                                </p:cTn>
+                              </p:par>
+                            </p:childTnLst>
+                          </p:cTn>
+                        </p:par>
+                        <p:par>
+                          <p:cTn id="8" fill="hold">
+                            <p:stCondLst>
+                              <p:cond delay="500"/>
+                            </p:stCondLst>
+                            <p:childTnLst>
+                              <p:par>
+                                <p:cTn id="9" presetID="10" presetClass="entr" presetSubtype="0" fill="hold" grpId="0" nodeType="afterEffect">
+                                  <p:stCondLst>
+                                    <p:cond delay="0"/>
+                                  </p:stCondLst>
+                                  <p:childTnLst>
+                                    <p:set>
+                                      <p:cBhvr>
+                                        <p:cTn id="10" dur="1" fill="hold">
+                                          <p:stCondLst>
+                                            <p:cond delay="0"/>
+                                          </p:stCondLst>
+                                        </p:cTn>
+                                        <p:tgtEl>
+                                          <p:spTgt spid="3">
+                                            <p:txEl>
+                                              <p:pRg st="1" end="1"/>
+                                            </p:txEl>
+                                          </p:spTgt>
+                                        </p:tgtEl>
+                                        <p:attrNameLst>
+                                          <p:attrName>style.visibility</p:attrName>
+                                        </p:attrNameLst>
+                                      </p:cBhvr>
+                                      <p:to>
+                                        <p:strVal val="visible"/>
+                                      </p:to>
+                                    </p:set>
+                                    <p:animEffect transition="in" filter="fade">
+                                      <p:cBhvr>
+                                        <p:cTn id="11" dur="500"/>
+                                        <p:tgtEl>
+                                          <p:spTgt spid="3">
+                                            <p:txEl>
+                                              <p:pRg st="1" end="1"/>
+                                            </p:txEl>
+                                          </p:spTgt>
+                                        </p:tgtEl>
+                                      </p:cBhvr>
+                                    </p:animEffect>
+                                  </p:childTnLst>
+                                </p:cTn>
+                              </p:par>
+                            </p:childTnLst>
+                          </p:cTn>
+                        </p:par>
+                      </p:childTnLst>
+                    </p:cTn>
+                  </p:par>
+                  <p:par>
+                    <p:cTn id="12" fill="hold">
+                      <p:stCondLst>
+                        <p:cond delay="indefinite"/>
+                      </p:stCondLst>
+                      <p:childTnLst>
+                        <p:par>
+                          <p:cTn id="13" fill="hold">
+                            <p:stCondLst>
+                              <p:cond delay="0"/>
+                            </p:stCondLst>
+                            <p:childTnLst>
+                              <p:par>
+                                <p:cTn id="14" presetID="10" presetClass="entr" presetSubtype="0" fill="hold" grpId="0" nodeType="clickEffect">
+                                  <p:stCondLst>
+                                    <p:cond delay="0"/>
+                                  </p:stCondLst>
+                                  <p:childTnLst>
+                                    <p:set>
+                                      <p:cBhvr>
+                                        <p:cTn id="15" dur="1" fill="hold">
+                                          <p:stCondLst>
+                                            <p:cond delay="0"/>
+                                          </p:stCondLst>
+                                        </p:cTn>
+                                        <p:tgtEl>
+                                          <p:spTgt spid="3">
+                                            <p:txEl>
+                                              <p:pRg st="2" end="2"/>
+                                            </p:txEl>
+                                          </p:spTgt>
+                                        </p:tgtEl>
+                                        <p:attrNameLst>
+                                          <p:attrName>style.visibility</p:attrName>
+                                        </p:attrNameLst>
+                                      </p:cBhvr>
+                                      <p:to>
+                                        <p:strVal val="visible"/>
+                                      </p:to>
+                                    </p:set>
+                                    <p:animEffect transition="in" filter="fade">
+                                      <p:cBhvr>
+                                        <p:cTn id="16" dur="500"/>
+                                        <p:tgtEl>
+                                          <p:spTgt spid="3">
+                                            <p:txEl>
+                                              <p:pRg st="2" end="2"/>
+                                            </p:txEl>
+                                          </p:spTgt>
+                                        </p:tgtEl>
+                                      </p:cBhvr>
+                                    </p:animEffect>
+                                  </p:childTnLst>
+                                </p:cTn>
+                              </p:par>
+                            </p:childTnLst>
+                          </p:cTn>
+                        </p:par>
+                      </p:childTnLst>
+                    </p:cTn>
+                  </p:par>
+                </p:childTnLst>
+              </p:cTn>
+              <p:prevCondLst>
+                <p:cond evt="onPrev" delay="0">
+                  <p:tgtEl>
+                    <p:sldTgt/>
+                  </p:tgtEl>
+                </p:cond>
+              </p:prevCondLst>
+              <p:nextCondLst>
+                <p:cond evt="onNext" delay="0">
+                  <p:tgtEl>
+                    <p:sldTgt/>
+                  </p:tgtEl>
+                </p:cond>
+              </p:nextCondLst>
+            </p:seq>
+          </p:childTnLst>
+        </p:cTn>
+      </p:par>
+    </p:tnLst>
+    <p:bldLst>
+      <p:bldP spid="3" grpId="0" uiExpand="1" build="p"/>
+    </p:bldLst>
+  </p:timing>
+</p:sld>
+</file>
+
+<file path=ppt/slides/slide46.xml><?xml version="1.0" encoding="utf-8"?>
+<p:sld xmlns:a="http://schemas.openxmlformats.org/drawingml/2006/main" xmlns:r="http://schemas.openxmlformats.org/officeDocument/2006/relationships" xmlns:p="http://schemas.openxmlformats.org/presentationml/2006/main">
+  <p:cSld>
+    <p:spTree>
+      <p:nvGrpSpPr>
+        <p:cNvPr id="1" name=""/>
+        <p:cNvGrpSpPr/>
+        <p:nvPr/>
+      </p:nvGrpSpPr>
+      <p:grpSpPr>
+        <a:xfrm>
+          <a:off x="0" y="0"/>
+          <a:ext cx="0" cy="0"/>
+          <a:chOff x="0" y="0"/>
+          <a:chExt cx="0" cy="0"/>
+        </a:xfrm>
+      </p:grpSpPr>
+      <p:sp>
+        <p:nvSpPr>
+          <p:cNvPr id="2" name="Title 1">
+            <a:extLst>
+              <a:ext uri="{FF2B5EF4-FFF2-40B4-BE49-F238E27FC236}">
                 <a16:creationId xmlns:a16="http://schemas.microsoft.com/office/drawing/2014/main" id="{7839FCC2-6E9C-0369-313B-768EEC25DC46}"/>
               </a:ext>
             </a:extLst>
@@ -35557,7 +37852,7 @@
 </p:sld>
 </file>
 
-<file path=ppt/slides/slide43.xml><?xml version="1.0" encoding="utf-8"?>
+<file path=ppt/slides/slide47.xml><?xml version="1.0" encoding="utf-8"?>
 <p:sld xmlns:a="http://schemas.openxmlformats.org/drawingml/2006/main" xmlns:r="http://schemas.openxmlformats.org/officeDocument/2006/relationships" xmlns:p="http://schemas.openxmlformats.org/presentationml/2006/main">
   <p:cSld>
     <p:spTree>
@@ -35792,7 +38087,7 @@
 </p:sld>
 </file>
 
-<file path=ppt/slides/slide44.xml><?xml version="1.0" encoding="utf-8"?>
+<file path=ppt/slides/slide48.xml><?xml version="1.0" encoding="utf-8"?>
 <p:sld xmlns:a="http://schemas.openxmlformats.org/drawingml/2006/main" xmlns:r="http://schemas.openxmlformats.org/officeDocument/2006/relationships" xmlns:p="http://schemas.openxmlformats.org/presentationml/2006/main">
   <p:cSld>
     <p:spTree>
@@ -35943,7 +38238,7 @@
 </p:sld>
 </file>
 
-<file path=ppt/slides/slide45.xml><?xml version="1.0" encoding="utf-8"?>
+<file path=ppt/slides/slide49.xml><?xml version="1.0" encoding="utf-8"?>
 <p:sld xmlns:a="http://schemas.openxmlformats.org/drawingml/2006/main" xmlns:r="http://schemas.openxmlformats.org/officeDocument/2006/relationships" xmlns:p="http://schemas.openxmlformats.org/presentationml/2006/main" show="0">
   <p:cSld>
     <p:spTree>

</xml_diff>

<commit_message>
Addressing Issue #3 suggestions
</commit_message>
<xml_diff>
--- a/instructors/files/SWC slides R Shiny 2024 Fall.pptx
+++ b/instructors/files/SWC slides R Shiny 2024 Fall.pptx
@@ -3209,8 +3209,13 @@
           <a:p>
             <a:r>
               <a:rPr lang="en-US" dirty="0"/>
-              <a:t>(Go do all this in R, and then start the app to show them)</a:t>
-            </a:r>
+              <a:t>(Go do all this in R, and then start the app to show them—remind them at this point to switch to “</a:t>
+            </a:r>
+            <a:r>
+              <a:rPr lang="en-US"/>
+              <a:t>launch external”!!!)</a:t>
+            </a:r>
+            <a:endParaRPr lang="en-US" dirty="0"/>
           </a:p>
         </p:txBody>
       </p:sp>

</xml_diff>